<commit_message>
-Estou seguinte a estrutura de tópicos do nosso relatório -Devemos apresentar apenas os tópicos existentes em nosso relatório
</commit_message>
<xml_diff>
--- a/qualificacao.pptx
+++ b/qualificacao.pptx
@@ -6,10 +6,26 @@
   </p:sldMasterIdLst>
   <p:sldIdLst>
     <p:sldId id="256" r:id="rId2"/>
-    <p:sldId id="257" r:id="rId3"/>
-    <p:sldId id="258" r:id="rId4"/>
-    <p:sldId id="259" r:id="rId5"/>
-    <p:sldId id="260" r:id="rId6"/>
+    <p:sldId id="261" r:id="rId3"/>
+    <p:sldId id="272" r:id="rId4"/>
+    <p:sldId id="273" r:id="rId5"/>
+    <p:sldId id="274" r:id="rId6"/>
+    <p:sldId id="275" r:id="rId7"/>
+    <p:sldId id="262" r:id="rId8"/>
+    <p:sldId id="265" r:id="rId9"/>
+    <p:sldId id="263" r:id="rId10"/>
+    <p:sldId id="264" r:id="rId11"/>
+    <p:sldId id="276" r:id="rId12"/>
+    <p:sldId id="277" r:id="rId13"/>
+    <p:sldId id="278" r:id="rId14"/>
+    <p:sldId id="279" r:id="rId15"/>
+    <p:sldId id="267" r:id="rId16"/>
+    <p:sldId id="270" r:id="rId17"/>
+    <p:sldId id="271" r:id="rId18"/>
+    <p:sldId id="257" r:id="rId19"/>
+    <p:sldId id="258" r:id="rId20"/>
+    <p:sldId id="259" r:id="rId21"/>
+    <p:sldId id="260" r:id="rId22"/>
   </p:sldIdLst>
   <p:sldSz cx="9144000" cy="6858000" type="screen4x3"/>
   <p:notesSz cx="6858000" cy="9144000"/>
@@ -255,7 +271,7 @@
             <a:fld id="{1D8BD707-D9CF-40AE-B4C6-C98DA3205C09}" type="datetimeFigureOut">
               <a:rPr lang="en-US" smtClean="0"/>
               <a:pPr/>
-              <a:t>10/14/2011</a:t>
+              <a:t>10/16/2011</a:t>
             </a:fld>
             <a:endParaRPr lang="en-US"/>
           </a:p>
@@ -308,7 +324,7 @@
             <a:fld id="{B6F15528-21DE-4FAA-801E-634DDDAF4B2B}" type="slidenum">
               <a:rPr lang="en-US" smtClean="0"/>
               <a:pPr/>
-              <a:t>‹#›</a:t>
+              <a:t>‹nº›</a:t>
             </a:fld>
             <a:endParaRPr lang="en-US"/>
           </a:p>
@@ -616,7 +632,7 @@
             <a:fld id="{1D8BD707-D9CF-40AE-B4C6-C98DA3205C09}" type="datetimeFigureOut">
               <a:rPr lang="en-US" smtClean="0"/>
               <a:pPr/>
-              <a:t>10/14/2011</a:t>
+              <a:t>10/16/2011</a:t>
             </a:fld>
             <a:endParaRPr lang="en-US"/>
           </a:p>
@@ -659,7 +675,7 @@
             <a:fld id="{B6F15528-21DE-4FAA-801E-634DDDAF4B2B}" type="slidenum">
               <a:rPr lang="en-US" smtClean="0"/>
               <a:pPr/>
-              <a:t>‹#›</a:t>
+              <a:t>‹nº›</a:t>
             </a:fld>
             <a:endParaRPr lang="en-US"/>
           </a:p>
@@ -793,7 +809,7 @@
             <a:fld id="{1D8BD707-D9CF-40AE-B4C6-C98DA3205C09}" type="datetimeFigureOut">
               <a:rPr lang="en-US" smtClean="0"/>
               <a:pPr/>
-              <a:t>10/14/2011</a:t>
+              <a:t>10/16/2011</a:t>
             </a:fld>
             <a:endParaRPr lang="en-US"/>
           </a:p>
@@ -836,7 +852,7 @@
             <a:fld id="{B6F15528-21DE-4FAA-801E-634DDDAF4B2B}" type="slidenum">
               <a:rPr lang="en-US" smtClean="0"/>
               <a:pPr/>
-              <a:t>‹#›</a:t>
+              <a:t>‹nº›</a:t>
             </a:fld>
             <a:endParaRPr lang="en-US"/>
           </a:p>
@@ -1030,7 +1046,7 @@
             <a:fld id="{1D8BD707-D9CF-40AE-B4C6-C98DA3205C09}" type="datetimeFigureOut">
               <a:rPr lang="en-US" smtClean="0"/>
               <a:pPr/>
-              <a:t>10/14/2011</a:t>
+              <a:t>10/16/2011</a:t>
             </a:fld>
             <a:endParaRPr lang="en-US"/>
           </a:p>
@@ -1073,7 +1089,7 @@
             <a:fld id="{B6F15528-21DE-4FAA-801E-634DDDAF4B2B}" type="slidenum">
               <a:rPr lang="en-US" smtClean="0"/>
               <a:pPr/>
-              <a:t>‹#›</a:t>
+              <a:t>‹nº›</a:t>
             </a:fld>
             <a:endParaRPr lang="en-US"/>
           </a:p>
@@ -1301,7 +1317,7 @@
             <a:fld id="{1D8BD707-D9CF-40AE-B4C6-C98DA3205C09}" type="datetimeFigureOut">
               <a:rPr lang="en-US" smtClean="0"/>
               <a:pPr/>
-              <a:t>10/14/2011</a:t>
+              <a:t>10/16/2011</a:t>
             </a:fld>
             <a:endParaRPr lang="en-US"/>
           </a:p>
@@ -1354,7 +1370,7 @@
             <a:fld id="{B6F15528-21DE-4FAA-801E-634DDDAF4B2B}" type="slidenum">
               <a:rPr lang="en-US" smtClean="0"/>
               <a:pPr/>
-              <a:t>‹#›</a:t>
+              <a:t>‹nº›</a:t>
             </a:fld>
             <a:endParaRPr lang="en-US"/>
           </a:p>
@@ -1523,7 +1539,7 @@
             <a:fld id="{1D8BD707-D9CF-40AE-B4C6-C98DA3205C09}" type="datetimeFigureOut">
               <a:rPr lang="en-US" smtClean="0"/>
               <a:pPr/>
-              <a:t>10/14/2011</a:t>
+              <a:t>10/16/2011</a:t>
             </a:fld>
             <a:endParaRPr lang="en-US"/>
           </a:p>
@@ -1566,7 +1582,7 @@
             <a:fld id="{B6F15528-21DE-4FAA-801E-634DDDAF4B2B}" type="slidenum">
               <a:rPr lang="en-US" smtClean="0"/>
               <a:pPr/>
-              <a:t>‹#›</a:t>
+              <a:t>‹nº›</a:t>
             </a:fld>
             <a:endParaRPr lang="en-US"/>
           </a:p>
@@ -1877,7 +1893,7 @@
             <a:fld id="{1D8BD707-D9CF-40AE-B4C6-C98DA3205C09}" type="datetimeFigureOut">
               <a:rPr lang="en-US" smtClean="0"/>
               <a:pPr/>
-              <a:t>10/14/2011</a:t>
+              <a:t>10/16/2011</a:t>
             </a:fld>
             <a:endParaRPr lang="en-US"/>
           </a:p>
@@ -1920,7 +1936,7 @@
             <a:fld id="{B6F15528-21DE-4FAA-801E-634DDDAF4B2B}" type="slidenum">
               <a:rPr lang="en-US" smtClean="0"/>
               <a:pPr/>
-              <a:t>‹#›</a:t>
+              <a:t>‹nº›</a:t>
             </a:fld>
             <a:endParaRPr lang="en-US"/>
           </a:p>
@@ -2111,7 +2127,7 @@
             <a:fld id="{1D8BD707-D9CF-40AE-B4C6-C98DA3205C09}" type="datetimeFigureOut">
               <a:rPr lang="en-US" smtClean="0"/>
               <a:pPr/>
-              <a:t>10/14/2011</a:t>
+              <a:t>10/16/2011</a:t>
             </a:fld>
             <a:endParaRPr lang="en-US"/>
           </a:p>
@@ -2154,7 +2170,7 @@
             <a:fld id="{B6F15528-21DE-4FAA-801E-634DDDAF4B2B}" type="slidenum">
               <a:rPr lang="en-US" smtClean="0"/>
               <a:pPr/>
-              <a:t>‹#›</a:t>
+              <a:t>‹nº›</a:t>
             </a:fld>
             <a:endParaRPr lang="en-US"/>
           </a:p>
@@ -2253,7 +2269,7 @@
             <a:fld id="{1D8BD707-D9CF-40AE-B4C6-C98DA3205C09}" type="datetimeFigureOut">
               <a:rPr lang="en-US" smtClean="0"/>
               <a:pPr/>
-              <a:t>10/14/2011</a:t>
+              <a:t>10/16/2011</a:t>
             </a:fld>
             <a:endParaRPr lang="en-US"/>
           </a:p>
@@ -2296,7 +2312,7 @@
             <a:fld id="{B6F15528-21DE-4FAA-801E-634DDDAF4B2B}" type="slidenum">
               <a:rPr lang="en-US" smtClean="0"/>
               <a:pPr/>
-              <a:t>‹#›</a:t>
+              <a:t>‹nº›</a:t>
             </a:fld>
             <a:endParaRPr lang="en-US"/>
           </a:p>
@@ -2532,7 +2548,7 @@
             <a:fld id="{1D8BD707-D9CF-40AE-B4C6-C98DA3205C09}" type="datetimeFigureOut">
               <a:rPr lang="en-US" smtClean="0"/>
               <a:pPr/>
-              <a:t>10/14/2011</a:t>
+              <a:t>10/16/2011</a:t>
             </a:fld>
             <a:endParaRPr lang="en-US"/>
           </a:p>
@@ -2575,7 +2591,7 @@
             <a:fld id="{B6F15528-21DE-4FAA-801E-634DDDAF4B2B}" type="slidenum">
               <a:rPr lang="en-US" smtClean="0"/>
               <a:pPr/>
-              <a:t>‹#›</a:t>
+              <a:t>‹nº›</a:t>
             </a:fld>
             <a:endParaRPr lang="en-US"/>
           </a:p>
@@ -2941,7 +2957,7 @@
             <a:fld id="{1D8BD707-D9CF-40AE-B4C6-C98DA3205C09}" type="datetimeFigureOut">
               <a:rPr lang="en-US" smtClean="0"/>
               <a:pPr/>
-              <a:t>10/14/2011</a:t>
+              <a:t>10/16/2011</a:t>
             </a:fld>
             <a:endParaRPr lang="en-US"/>
           </a:p>
@@ -2984,7 +3000,7 @@
             <a:fld id="{B6F15528-21DE-4FAA-801E-634DDDAF4B2B}" type="slidenum">
               <a:rPr lang="en-US" smtClean="0"/>
               <a:pPr/>
-              <a:t>‹#›</a:t>
+              <a:t>‹nº›</a:t>
             </a:fld>
             <a:endParaRPr lang="en-US"/>
           </a:p>
@@ -3281,7 +3297,7 @@
             <a:fld id="{1D8BD707-D9CF-40AE-B4C6-C98DA3205C09}" type="datetimeFigureOut">
               <a:rPr lang="en-US" smtClean="0"/>
               <a:pPr/>
-              <a:t>10/14/2011</a:t>
+              <a:t>10/16/2011</a:t>
             </a:fld>
             <a:endParaRPr lang="en-US"/>
           </a:p>
@@ -3356,7 +3372,7 @@
             <a:fld id="{B6F15528-21DE-4FAA-801E-634DDDAF4B2B}" type="slidenum">
               <a:rPr lang="en-US" smtClean="0"/>
               <a:pPr/>
-              <a:t>‹#›</a:t>
+              <a:t>‹nº›</a:t>
             </a:fld>
             <a:endParaRPr lang="en-US"/>
           </a:p>
@@ -3968,6 +3984,1041 @@
 </p:sld>
 </file>
 
+<file path=ppt/slides/slide10.xml><?xml version="1.0" encoding="utf-8"?>
+<p:sld xmlns:a="http://schemas.openxmlformats.org/drawingml/2006/main" xmlns:r="http://schemas.openxmlformats.org/officeDocument/2006/relationships" xmlns:p="http://schemas.openxmlformats.org/presentationml/2006/main">
+  <p:cSld>
+    <p:spTree>
+      <p:nvGrpSpPr>
+        <p:cNvPr id="1" name=""/>
+        <p:cNvGrpSpPr/>
+        <p:nvPr/>
+      </p:nvGrpSpPr>
+      <p:grpSpPr>
+        <a:xfrm>
+          <a:off x="0" y="0"/>
+          <a:ext cx="0" cy="0"/>
+          <a:chOff x="0" y="0"/>
+          <a:chExt cx="0" cy="0"/>
+        </a:xfrm>
+      </p:grpSpPr>
+      <p:sp>
+        <p:nvSpPr>
+          <p:cNvPr id="2" name="Título 1"/>
+          <p:cNvSpPr>
+            <a:spLocks noGrp="1"/>
+          </p:cNvSpPr>
+          <p:nvPr>
+            <p:ph type="title"/>
+          </p:nvPr>
+        </p:nvSpPr>
+        <p:spPr/>
+        <p:txBody>
+          <a:bodyPr/>
+          <a:lstStyle/>
+          <a:p>
+            <a:r>
+              <a:rPr lang="pt-BR" dirty="0" smtClean="0"/>
+              <a:t>Especificação do Robô</a:t>
+            </a:r>
+            <a:endParaRPr lang="pt-BR" dirty="0"/>
+          </a:p>
+        </p:txBody>
+      </p:sp>
+      <p:sp>
+        <p:nvSpPr>
+          <p:cNvPr id="3" name="Espaço Reservado para Conteúdo 2"/>
+          <p:cNvSpPr>
+            <a:spLocks noGrp="1"/>
+          </p:cNvSpPr>
+          <p:nvPr>
+            <p:ph sz="quarter" idx="1"/>
+          </p:nvPr>
+        </p:nvSpPr>
+        <p:spPr/>
+        <p:txBody>
+          <a:bodyPr/>
+          <a:lstStyle/>
+          <a:p>
+            <a:r>
+              <a:rPr lang="pt-BR" dirty="0" smtClean="0"/>
+              <a:t>Sensor IR 2Y0A02F98</a:t>
+            </a:r>
+          </a:p>
+          <a:p>
+            <a:r>
+              <a:rPr lang="pt-BR" dirty="0" err="1" smtClean="0"/>
+              <a:t>Microcontrolador</a:t>
+            </a:r>
+            <a:r>
+              <a:rPr lang="pt-BR" dirty="0" smtClean="0"/>
+              <a:t> C8051F340DK</a:t>
+            </a:r>
+          </a:p>
+          <a:p>
+            <a:r>
+              <a:rPr lang="pt-BR" dirty="0" err="1" smtClean="0"/>
+              <a:t>Encoder</a:t>
+            </a:r>
+            <a:r>
+              <a:rPr lang="pt-BR" dirty="0" smtClean="0"/>
+              <a:t> </a:t>
+            </a:r>
+            <a:r>
+              <a:rPr lang="pt-BR" dirty="0" smtClean="0"/>
+              <a:t>HEDS-9700</a:t>
+            </a:r>
+          </a:p>
+          <a:p>
+            <a:r>
+              <a:rPr lang="pt-BR" dirty="0" smtClean="0"/>
+              <a:t>Robô </a:t>
+            </a:r>
+            <a:r>
+              <a:rPr lang="pt-BR" dirty="0" err="1" smtClean="0"/>
+              <a:t>Bellator</a:t>
+            </a:r>
+            <a:endParaRPr lang="pt-BR" dirty="0" smtClean="0"/>
+          </a:p>
+          <a:p>
+            <a:r>
+              <a:rPr lang="pt-BR" dirty="0" smtClean="0"/>
+              <a:t>Placa de </a:t>
+            </a:r>
+            <a:r>
+              <a:rPr lang="pt-BR" dirty="0" err="1" smtClean="0"/>
+              <a:t>Roteamento</a:t>
+            </a:r>
+            <a:endParaRPr lang="pt-BR" dirty="0" smtClean="0"/>
+          </a:p>
+          <a:p>
+            <a:r>
+              <a:rPr lang="pt-BR" dirty="0" smtClean="0"/>
+              <a:t>Considerações</a:t>
+            </a:r>
+            <a:endParaRPr lang="pt-BR" dirty="0"/>
+          </a:p>
+        </p:txBody>
+      </p:sp>
+    </p:spTree>
+  </p:cSld>
+  <p:clrMapOvr>
+    <a:masterClrMapping/>
+  </p:clrMapOvr>
+</p:sld>
+</file>
+
+<file path=ppt/slides/slide11.xml><?xml version="1.0" encoding="utf-8"?>
+<p:sld xmlns:a="http://schemas.openxmlformats.org/drawingml/2006/main" xmlns:r="http://schemas.openxmlformats.org/officeDocument/2006/relationships" xmlns:p="http://schemas.openxmlformats.org/presentationml/2006/main">
+  <p:cSld>
+    <p:spTree>
+      <p:nvGrpSpPr>
+        <p:cNvPr id="1" name=""/>
+        <p:cNvGrpSpPr/>
+        <p:nvPr/>
+      </p:nvGrpSpPr>
+      <p:grpSpPr>
+        <a:xfrm>
+          <a:off x="0" y="0"/>
+          <a:ext cx="0" cy="0"/>
+          <a:chOff x="0" y="0"/>
+          <a:chExt cx="0" cy="0"/>
+        </a:xfrm>
+      </p:grpSpPr>
+      <p:sp>
+        <p:nvSpPr>
+          <p:cNvPr id="2" name="Título 1"/>
+          <p:cNvSpPr>
+            <a:spLocks noGrp="1"/>
+          </p:cNvSpPr>
+          <p:nvPr>
+            <p:ph type="title"/>
+          </p:nvPr>
+        </p:nvSpPr>
+        <p:spPr/>
+        <p:txBody>
+          <a:bodyPr/>
+          <a:lstStyle/>
+          <a:p>
+            <a:r>
+              <a:rPr lang="pt-BR" dirty="0" smtClean="0"/>
+              <a:t>Sensor IR 2Y0A02F98</a:t>
+            </a:r>
+            <a:endParaRPr lang="pt-BR" dirty="0"/>
+          </a:p>
+        </p:txBody>
+      </p:sp>
+      <p:sp>
+        <p:nvSpPr>
+          <p:cNvPr id="3" name="Espaço Reservado para Conteúdo 2"/>
+          <p:cNvSpPr>
+            <a:spLocks noGrp="1"/>
+          </p:cNvSpPr>
+          <p:nvPr>
+            <p:ph sz="quarter" idx="1"/>
+          </p:nvPr>
+        </p:nvSpPr>
+        <p:spPr/>
+        <p:txBody>
+          <a:bodyPr/>
+          <a:lstStyle/>
+          <a:p>
+            <a:endParaRPr lang="pt-BR"/>
+          </a:p>
+        </p:txBody>
+      </p:sp>
+    </p:spTree>
+  </p:cSld>
+  <p:clrMapOvr>
+    <a:masterClrMapping/>
+  </p:clrMapOvr>
+</p:sld>
+</file>
+
+<file path=ppt/slides/slide12.xml><?xml version="1.0" encoding="utf-8"?>
+<p:sld xmlns:a="http://schemas.openxmlformats.org/drawingml/2006/main" xmlns:r="http://schemas.openxmlformats.org/officeDocument/2006/relationships" xmlns:p="http://schemas.openxmlformats.org/presentationml/2006/main">
+  <p:cSld>
+    <p:spTree>
+      <p:nvGrpSpPr>
+        <p:cNvPr id="1" name=""/>
+        <p:cNvGrpSpPr/>
+        <p:nvPr/>
+      </p:nvGrpSpPr>
+      <p:grpSpPr>
+        <a:xfrm>
+          <a:off x="0" y="0"/>
+          <a:ext cx="0" cy="0"/>
+          <a:chOff x="0" y="0"/>
+          <a:chExt cx="0" cy="0"/>
+        </a:xfrm>
+      </p:grpSpPr>
+      <p:sp>
+        <p:nvSpPr>
+          <p:cNvPr id="2" name="Título 1"/>
+          <p:cNvSpPr>
+            <a:spLocks noGrp="1"/>
+          </p:cNvSpPr>
+          <p:nvPr>
+            <p:ph type="title"/>
+          </p:nvPr>
+        </p:nvSpPr>
+        <p:spPr/>
+        <p:txBody>
+          <a:bodyPr/>
+          <a:lstStyle/>
+          <a:p>
+            <a:r>
+              <a:rPr lang="pt-BR" dirty="0" err="1" smtClean="0"/>
+              <a:t>Microcontrolador</a:t>
+            </a:r>
+            <a:r>
+              <a:rPr lang="pt-BR" dirty="0" smtClean="0"/>
+              <a:t> C8051F340DK</a:t>
+            </a:r>
+            <a:endParaRPr lang="pt-BR" dirty="0"/>
+          </a:p>
+        </p:txBody>
+      </p:sp>
+      <p:sp>
+        <p:nvSpPr>
+          <p:cNvPr id="3" name="Espaço Reservado para Conteúdo 2"/>
+          <p:cNvSpPr>
+            <a:spLocks noGrp="1"/>
+          </p:cNvSpPr>
+          <p:nvPr>
+            <p:ph sz="quarter" idx="1"/>
+          </p:nvPr>
+        </p:nvSpPr>
+        <p:spPr/>
+        <p:txBody>
+          <a:bodyPr/>
+          <a:lstStyle/>
+          <a:p>
+            <a:endParaRPr lang="pt-BR"/>
+          </a:p>
+        </p:txBody>
+      </p:sp>
+    </p:spTree>
+  </p:cSld>
+  <p:clrMapOvr>
+    <a:masterClrMapping/>
+  </p:clrMapOvr>
+</p:sld>
+</file>
+
+<file path=ppt/slides/slide13.xml><?xml version="1.0" encoding="utf-8"?>
+<p:sld xmlns:a="http://schemas.openxmlformats.org/drawingml/2006/main" xmlns:r="http://schemas.openxmlformats.org/officeDocument/2006/relationships" xmlns:p="http://schemas.openxmlformats.org/presentationml/2006/main">
+  <p:cSld>
+    <p:spTree>
+      <p:nvGrpSpPr>
+        <p:cNvPr id="1" name=""/>
+        <p:cNvGrpSpPr/>
+        <p:nvPr/>
+      </p:nvGrpSpPr>
+      <p:grpSpPr>
+        <a:xfrm>
+          <a:off x="0" y="0"/>
+          <a:ext cx="0" cy="0"/>
+          <a:chOff x="0" y="0"/>
+          <a:chExt cx="0" cy="0"/>
+        </a:xfrm>
+      </p:grpSpPr>
+      <p:sp>
+        <p:nvSpPr>
+          <p:cNvPr id="2" name="Título 1"/>
+          <p:cNvSpPr>
+            <a:spLocks noGrp="1"/>
+          </p:cNvSpPr>
+          <p:nvPr>
+            <p:ph type="title"/>
+          </p:nvPr>
+        </p:nvSpPr>
+        <p:spPr/>
+        <p:txBody>
+          <a:bodyPr/>
+          <a:lstStyle/>
+          <a:p>
+            <a:r>
+              <a:rPr lang="pt-BR" dirty="0" err="1" smtClean="0"/>
+              <a:t>Encoder</a:t>
+            </a:r>
+            <a:r>
+              <a:rPr lang="pt-BR" dirty="0" smtClean="0"/>
+              <a:t> HEDS-9700</a:t>
+            </a:r>
+            <a:endParaRPr lang="pt-BR" dirty="0"/>
+          </a:p>
+        </p:txBody>
+      </p:sp>
+      <p:sp>
+        <p:nvSpPr>
+          <p:cNvPr id="3" name="Espaço Reservado para Conteúdo 2"/>
+          <p:cNvSpPr>
+            <a:spLocks noGrp="1"/>
+          </p:cNvSpPr>
+          <p:nvPr>
+            <p:ph sz="quarter" idx="1"/>
+          </p:nvPr>
+        </p:nvSpPr>
+        <p:spPr/>
+        <p:txBody>
+          <a:bodyPr/>
+          <a:lstStyle/>
+          <a:p>
+            <a:r>
+              <a:rPr lang="pt-BR" dirty="0" err="1" smtClean="0"/>
+              <a:t>Encoder</a:t>
+            </a:r>
+            <a:r>
+              <a:rPr lang="pt-BR" dirty="0" smtClean="0"/>
+              <a:t> de quadratura (2 canais)</a:t>
+            </a:r>
+          </a:p>
+          <a:p>
+            <a:r>
+              <a:rPr lang="pt-BR" dirty="0" smtClean="0"/>
+              <a:t>Baixo custo</a:t>
+            </a:r>
+          </a:p>
+          <a:p>
+            <a:r>
+              <a:rPr lang="pt-BR" dirty="0" smtClean="0"/>
+              <a:t>Não precisa tratar o sinal</a:t>
+            </a:r>
+          </a:p>
+          <a:p>
+            <a:r>
+              <a:rPr lang="pt-BR" dirty="0" smtClean="0"/>
+              <a:t>Compatível com nível TTL</a:t>
+            </a:r>
+          </a:p>
+          <a:p>
+            <a:endParaRPr lang="pt-BR" dirty="0"/>
+          </a:p>
+        </p:txBody>
+      </p:sp>
+      <p:pic>
+        <p:nvPicPr>
+          <p:cNvPr id="2050" name="Picture 2"/>
+          <p:cNvPicPr>
+            <a:picLocks noChangeAspect="1" noChangeArrowheads="1"/>
+          </p:cNvPicPr>
+          <p:nvPr/>
+        </p:nvPicPr>
+        <p:blipFill>
+          <a:blip r:embed="rId2" cstate="print"/>
+          <a:srcRect/>
+          <a:stretch>
+            <a:fillRect/>
+          </a:stretch>
+        </p:blipFill>
+        <p:spPr bwMode="auto">
+          <a:xfrm>
+            <a:off x="6629400" y="1295400"/>
+            <a:ext cx="2126202" cy="2066026"/>
+          </a:xfrm>
+          <a:prstGeom prst="rect">
+            <a:avLst/>
+          </a:prstGeom>
+          <a:noFill/>
+          <a:ln w="9525">
+            <a:noFill/>
+            <a:miter lim="800000"/>
+            <a:headEnd/>
+            <a:tailEnd/>
+          </a:ln>
+        </p:spPr>
+      </p:pic>
+      <p:pic>
+        <p:nvPicPr>
+          <p:cNvPr id="2051" name="Picture 3"/>
+          <p:cNvPicPr>
+            <a:picLocks noChangeAspect="1" noChangeArrowheads="1"/>
+          </p:cNvPicPr>
+          <p:nvPr/>
+        </p:nvPicPr>
+        <p:blipFill>
+          <a:blip r:embed="rId3" cstate="print"/>
+          <a:srcRect/>
+          <a:stretch>
+            <a:fillRect/>
+          </a:stretch>
+        </p:blipFill>
+        <p:spPr bwMode="auto">
+          <a:xfrm>
+            <a:off x="457200" y="3048000"/>
+            <a:ext cx="4721190" cy="3809046"/>
+          </a:xfrm>
+          <a:prstGeom prst="rect">
+            <a:avLst/>
+          </a:prstGeom>
+          <a:noFill/>
+          <a:ln w="9525">
+            <a:noFill/>
+            <a:miter lim="800000"/>
+            <a:headEnd/>
+            <a:tailEnd/>
+          </a:ln>
+        </p:spPr>
+      </p:pic>
+    </p:spTree>
+  </p:cSld>
+  <p:clrMapOvr>
+    <a:masterClrMapping/>
+  </p:clrMapOvr>
+</p:sld>
+</file>
+
+<file path=ppt/slides/slide14.xml><?xml version="1.0" encoding="utf-8"?>
+<p:sld xmlns:a="http://schemas.openxmlformats.org/drawingml/2006/main" xmlns:r="http://schemas.openxmlformats.org/officeDocument/2006/relationships" xmlns:p="http://schemas.openxmlformats.org/presentationml/2006/main">
+  <p:cSld>
+    <p:spTree>
+      <p:nvGrpSpPr>
+        <p:cNvPr id="1" name=""/>
+        <p:cNvGrpSpPr/>
+        <p:nvPr/>
+      </p:nvGrpSpPr>
+      <p:grpSpPr>
+        <a:xfrm>
+          <a:off x="0" y="0"/>
+          <a:ext cx="0" cy="0"/>
+          <a:chOff x="0" y="0"/>
+          <a:chExt cx="0" cy="0"/>
+        </a:xfrm>
+      </p:grpSpPr>
+      <p:sp>
+        <p:nvSpPr>
+          <p:cNvPr id="2" name="Título 1"/>
+          <p:cNvSpPr>
+            <a:spLocks noGrp="1"/>
+          </p:cNvSpPr>
+          <p:nvPr>
+            <p:ph type="title"/>
+          </p:nvPr>
+        </p:nvSpPr>
+        <p:spPr/>
+        <p:txBody>
+          <a:bodyPr/>
+          <a:lstStyle/>
+          <a:p>
+            <a:r>
+              <a:rPr lang="pt-BR" dirty="0" smtClean="0"/>
+              <a:t>Robô </a:t>
+            </a:r>
+            <a:r>
+              <a:rPr lang="pt-BR" dirty="0" err="1" smtClean="0"/>
+              <a:t>Bellator</a:t>
+            </a:r>
+            <a:endParaRPr lang="pt-BR" dirty="0"/>
+          </a:p>
+        </p:txBody>
+      </p:sp>
+      <p:pic>
+        <p:nvPicPr>
+          <p:cNvPr id="4" name="Espaço Reservado para Conteúdo 3" descr="Foto-0002.jpg"/>
+          <p:cNvPicPr>
+            <a:picLocks noGrp="1" noChangeAspect="1"/>
+          </p:cNvPicPr>
+          <p:nvPr>
+            <p:ph sz="quarter" idx="1"/>
+          </p:nvPr>
+        </p:nvPicPr>
+        <p:blipFill>
+          <a:blip r:embed="rId2" cstate="print"/>
+          <a:stretch>
+            <a:fillRect/>
+          </a:stretch>
+        </p:blipFill>
+        <p:spPr>
+          <a:xfrm>
+            <a:off x="1280583" y="1219200"/>
+            <a:ext cx="6582833" cy="4937125"/>
+          </a:xfrm>
+        </p:spPr>
+      </p:pic>
+    </p:spTree>
+  </p:cSld>
+  <p:clrMapOvr>
+    <a:masterClrMapping/>
+  </p:clrMapOvr>
+</p:sld>
+</file>
+
+<file path=ppt/slides/slide15.xml><?xml version="1.0" encoding="utf-8"?>
+<p:sld xmlns:a="http://schemas.openxmlformats.org/drawingml/2006/main" xmlns:r="http://schemas.openxmlformats.org/officeDocument/2006/relationships" xmlns:p="http://schemas.openxmlformats.org/presentationml/2006/main">
+  <p:cSld>
+    <p:spTree>
+      <p:nvGrpSpPr>
+        <p:cNvPr id="1" name=""/>
+        <p:cNvGrpSpPr/>
+        <p:nvPr/>
+      </p:nvGrpSpPr>
+      <p:grpSpPr>
+        <a:xfrm>
+          <a:off x="0" y="0"/>
+          <a:ext cx="0" cy="0"/>
+          <a:chOff x="0" y="0"/>
+          <a:chExt cx="0" cy="0"/>
+        </a:xfrm>
+      </p:grpSpPr>
+      <p:sp>
+        <p:nvSpPr>
+          <p:cNvPr id="2" name="Título 1"/>
+          <p:cNvSpPr>
+            <a:spLocks noGrp="1"/>
+          </p:cNvSpPr>
+          <p:nvPr>
+            <p:ph type="title"/>
+          </p:nvPr>
+        </p:nvSpPr>
+        <p:spPr/>
+        <p:txBody>
+          <a:bodyPr/>
+          <a:lstStyle/>
+          <a:p>
+            <a:r>
+              <a:rPr lang="pt-BR" dirty="0" smtClean="0"/>
+              <a:t>Placa de </a:t>
+            </a:r>
+            <a:r>
+              <a:rPr lang="pt-BR" dirty="0" err="1" smtClean="0"/>
+              <a:t>Roteamento</a:t>
+            </a:r>
+            <a:endParaRPr lang="pt-BR" dirty="0"/>
+          </a:p>
+        </p:txBody>
+      </p:sp>
+      <p:sp>
+        <p:nvSpPr>
+          <p:cNvPr id="3" name="Espaço Reservado para Conteúdo 2"/>
+          <p:cNvSpPr>
+            <a:spLocks noGrp="1"/>
+          </p:cNvSpPr>
+          <p:nvPr>
+            <p:ph sz="quarter" idx="1"/>
+          </p:nvPr>
+        </p:nvSpPr>
+        <p:spPr/>
+        <p:txBody>
+          <a:bodyPr/>
+          <a:lstStyle/>
+          <a:p>
+            <a:r>
+              <a:rPr lang="pt-BR" dirty="0" smtClean="0"/>
+              <a:t>Projeto</a:t>
+            </a:r>
+          </a:p>
+          <a:p>
+            <a:r>
+              <a:rPr lang="pt-BR" dirty="0" smtClean="0"/>
+              <a:t>Montagem</a:t>
+            </a:r>
+            <a:endParaRPr lang="pt-BR" dirty="0"/>
+          </a:p>
+        </p:txBody>
+      </p:sp>
+    </p:spTree>
+  </p:cSld>
+  <p:clrMapOvr>
+    <a:masterClrMapping/>
+  </p:clrMapOvr>
+</p:sld>
+</file>
+
+<file path=ppt/slides/slide16.xml><?xml version="1.0" encoding="utf-8"?>
+<p:sld xmlns:a="http://schemas.openxmlformats.org/drawingml/2006/main" xmlns:r="http://schemas.openxmlformats.org/officeDocument/2006/relationships" xmlns:p="http://schemas.openxmlformats.org/presentationml/2006/main">
+  <p:cSld>
+    <p:spTree>
+      <p:nvGrpSpPr>
+        <p:cNvPr id="1" name=""/>
+        <p:cNvGrpSpPr/>
+        <p:nvPr/>
+      </p:nvGrpSpPr>
+      <p:grpSpPr>
+        <a:xfrm>
+          <a:off x="0" y="0"/>
+          <a:ext cx="0" cy="0"/>
+          <a:chOff x="0" y="0"/>
+          <a:chExt cx="0" cy="0"/>
+        </a:xfrm>
+      </p:grpSpPr>
+      <p:sp>
+        <p:nvSpPr>
+          <p:cNvPr id="2" name="Título 1"/>
+          <p:cNvSpPr>
+            <a:spLocks noGrp="1"/>
+          </p:cNvSpPr>
+          <p:nvPr>
+            <p:ph type="title"/>
+          </p:nvPr>
+        </p:nvSpPr>
+        <p:spPr/>
+        <p:txBody>
+          <a:bodyPr/>
+          <a:lstStyle/>
+          <a:p>
+            <a:r>
+              <a:rPr lang="pt-BR" dirty="0" smtClean="0"/>
+              <a:t>Projeto</a:t>
+            </a:r>
+            <a:endParaRPr lang="pt-BR" dirty="0"/>
+          </a:p>
+        </p:txBody>
+      </p:sp>
+      <p:sp>
+        <p:nvSpPr>
+          <p:cNvPr id="3" name="Espaço Reservado para Conteúdo 2"/>
+          <p:cNvSpPr>
+            <a:spLocks noGrp="1"/>
+          </p:cNvSpPr>
+          <p:nvPr>
+            <p:ph sz="quarter" idx="1"/>
+          </p:nvPr>
+        </p:nvSpPr>
+        <p:spPr/>
+        <p:txBody>
+          <a:bodyPr/>
+          <a:lstStyle/>
+          <a:p>
+            <a:endParaRPr lang="pt-BR"/>
+          </a:p>
+        </p:txBody>
+      </p:sp>
+    </p:spTree>
+  </p:cSld>
+  <p:clrMapOvr>
+    <a:masterClrMapping/>
+  </p:clrMapOvr>
+</p:sld>
+</file>
+
+<file path=ppt/slides/slide17.xml><?xml version="1.0" encoding="utf-8"?>
+<p:sld xmlns:a="http://schemas.openxmlformats.org/drawingml/2006/main" xmlns:r="http://schemas.openxmlformats.org/officeDocument/2006/relationships" xmlns:p="http://schemas.openxmlformats.org/presentationml/2006/main">
+  <p:cSld>
+    <p:spTree>
+      <p:nvGrpSpPr>
+        <p:cNvPr id="1" name=""/>
+        <p:cNvGrpSpPr/>
+        <p:nvPr/>
+      </p:nvGrpSpPr>
+      <p:grpSpPr>
+        <a:xfrm>
+          <a:off x="0" y="0"/>
+          <a:ext cx="0" cy="0"/>
+          <a:chOff x="0" y="0"/>
+          <a:chExt cx="0" cy="0"/>
+        </a:xfrm>
+      </p:grpSpPr>
+      <p:sp>
+        <p:nvSpPr>
+          <p:cNvPr id="2" name="Título 1"/>
+          <p:cNvSpPr>
+            <a:spLocks noGrp="1"/>
+          </p:cNvSpPr>
+          <p:nvPr>
+            <p:ph type="title"/>
+          </p:nvPr>
+        </p:nvSpPr>
+        <p:spPr/>
+        <p:txBody>
+          <a:bodyPr/>
+          <a:lstStyle/>
+          <a:p>
+            <a:r>
+              <a:rPr lang="pt-BR" dirty="0" smtClean="0"/>
+              <a:t>Montagem</a:t>
+            </a:r>
+            <a:endParaRPr lang="pt-BR" dirty="0"/>
+          </a:p>
+        </p:txBody>
+      </p:sp>
+      <p:pic>
+        <p:nvPicPr>
+          <p:cNvPr id="4" name="Espaço Reservado para Conteúdo 3" descr="Foto-0072.jpg"/>
+          <p:cNvPicPr>
+            <a:picLocks noGrp="1" noChangeAspect="1"/>
+          </p:cNvPicPr>
+          <p:nvPr>
+            <p:ph sz="quarter" idx="1"/>
+          </p:nvPr>
+        </p:nvPicPr>
+        <p:blipFill>
+          <a:blip r:embed="rId2" cstate="print"/>
+          <a:stretch>
+            <a:fillRect/>
+          </a:stretch>
+        </p:blipFill>
+        <p:spPr>
+          <a:xfrm>
+            <a:off x="457200" y="1219200"/>
+            <a:ext cx="2743200" cy="2057400"/>
+          </a:xfrm>
+        </p:spPr>
+      </p:pic>
+      <p:pic>
+        <p:nvPicPr>
+          <p:cNvPr id="6" name="Imagem 5" descr="Foto-0078.jpg"/>
+          <p:cNvPicPr>
+            <a:picLocks noChangeAspect="1"/>
+          </p:cNvPicPr>
+          <p:nvPr/>
+        </p:nvPicPr>
+        <p:blipFill>
+          <a:blip r:embed="rId3" cstate="print"/>
+          <a:stretch>
+            <a:fillRect/>
+          </a:stretch>
+        </p:blipFill>
+        <p:spPr>
+          <a:xfrm>
+            <a:off x="6172200" y="1219200"/>
+            <a:ext cx="2743200" cy="2057400"/>
+          </a:xfrm>
+          <a:prstGeom prst="rect">
+            <a:avLst/>
+          </a:prstGeom>
+        </p:spPr>
+      </p:pic>
+      <p:pic>
+        <p:nvPicPr>
+          <p:cNvPr id="7" name="Imagem 6" descr="Foto-0077.jpg"/>
+          <p:cNvPicPr>
+            <a:picLocks noChangeAspect="1"/>
+          </p:cNvPicPr>
+          <p:nvPr/>
+        </p:nvPicPr>
+        <p:blipFill>
+          <a:blip r:embed="rId4" cstate="print"/>
+          <a:stretch>
+            <a:fillRect/>
+          </a:stretch>
+        </p:blipFill>
+        <p:spPr>
+          <a:xfrm>
+            <a:off x="3276600" y="1219200"/>
+            <a:ext cx="2743200" cy="2057400"/>
+          </a:xfrm>
+          <a:prstGeom prst="rect">
+            <a:avLst/>
+          </a:prstGeom>
+        </p:spPr>
+      </p:pic>
+      <p:pic>
+        <p:nvPicPr>
+          <p:cNvPr id="8" name="Imagem 7" descr="Foto-0079.jpg"/>
+          <p:cNvPicPr>
+            <a:picLocks noChangeAspect="1"/>
+          </p:cNvPicPr>
+          <p:nvPr/>
+        </p:nvPicPr>
+        <p:blipFill>
+          <a:blip r:embed="rId5" cstate="print"/>
+          <a:stretch>
+            <a:fillRect/>
+          </a:stretch>
+        </p:blipFill>
+        <p:spPr>
+          <a:xfrm>
+            <a:off x="457200" y="3429000"/>
+            <a:ext cx="3860800" cy="2895600"/>
+          </a:xfrm>
+          <a:prstGeom prst="rect">
+            <a:avLst/>
+          </a:prstGeom>
+        </p:spPr>
+      </p:pic>
+      <p:pic>
+        <p:nvPicPr>
+          <p:cNvPr id="9" name="Imagem 8" descr="Foto-0081.jpg"/>
+          <p:cNvPicPr>
+            <a:picLocks noChangeAspect="1"/>
+          </p:cNvPicPr>
+          <p:nvPr/>
+        </p:nvPicPr>
+        <p:blipFill>
+          <a:blip r:embed="rId6" cstate="print"/>
+          <a:stretch>
+            <a:fillRect/>
+          </a:stretch>
+        </p:blipFill>
+        <p:spPr>
+          <a:xfrm>
+            <a:off x="5105400" y="3429000"/>
+            <a:ext cx="3810000" cy="2857500"/>
+          </a:xfrm>
+          <a:prstGeom prst="rect">
+            <a:avLst/>
+          </a:prstGeom>
+        </p:spPr>
+      </p:pic>
+      <p:pic>
+        <p:nvPicPr>
+          <p:cNvPr id="1026" name="Picture 2"/>
+          <p:cNvPicPr>
+            <a:picLocks noChangeAspect="1" noChangeArrowheads="1"/>
+          </p:cNvPicPr>
+          <p:nvPr/>
+        </p:nvPicPr>
+        <p:blipFill>
+          <a:blip r:embed="rId7" cstate="print"/>
+          <a:srcRect/>
+          <a:stretch>
+            <a:fillRect/>
+          </a:stretch>
+        </p:blipFill>
+        <p:spPr bwMode="auto">
+          <a:xfrm>
+            <a:off x="3124200" y="4724400"/>
+            <a:ext cx="2962179" cy="1957387"/>
+          </a:xfrm>
+          <a:prstGeom prst="rect">
+            <a:avLst/>
+          </a:prstGeom>
+          <a:noFill/>
+          <a:ln w="9525">
+            <a:noFill/>
+            <a:miter lim="800000"/>
+            <a:headEnd/>
+            <a:tailEnd/>
+          </a:ln>
+        </p:spPr>
+      </p:pic>
+    </p:spTree>
+  </p:cSld>
+  <p:clrMapOvr>
+    <a:masterClrMapping/>
+  </p:clrMapOvr>
+</p:sld>
+</file>
+
+<file path=ppt/slides/slide18.xml><?xml version="1.0" encoding="utf-8"?>
+<p:sld xmlns:a="http://schemas.openxmlformats.org/drawingml/2006/main" xmlns:r="http://schemas.openxmlformats.org/officeDocument/2006/relationships" xmlns:p="http://schemas.openxmlformats.org/presentationml/2006/main">
+  <p:cSld>
+    <p:spTree>
+      <p:nvGrpSpPr>
+        <p:cNvPr id="1" name=""/>
+        <p:cNvGrpSpPr/>
+        <p:nvPr/>
+      </p:nvGrpSpPr>
+      <p:grpSpPr>
+        <a:xfrm>
+          <a:off x="0" y="0"/>
+          <a:ext cx="0" cy="0"/>
+          <a:chOff x="0" y="0"/>
+          <a:chExt cx="0" cy="0"/>
+        </a:xfrm>
+      </p:grpSpPr>
+      <p:sp>
+        <p:nvSpPr>
+          <p:cNvPr id="2" name="Title 1"/>
+          <p:cNvSpPr>
+            <a:spLocks noGrp="1"/>
+          </p:cNvSpPr>
+          <p:nvPr>
+            <p:ph type="title"/>
+          </p:nvPr>
+        </p:nvSpPr>
+        <p:spPr/>
+        <p:txBody>
+          <a:bodyPr/>
+          <a:lstStyle/>
+          <a:p>
+            <a:r>
+              <a:rPr lang="pt-BR" dirty="0" smtClean="0"/>
+              <a:t>Situação Inicial</a:t>
+            </a:r>
+            <a:endParaRPr lang="en-US" dirty="0"/>
+          </a:p>
+        </p:txBody>
+      </p:sp>
+      <p:sp>
+        <p:nvSpPr>
+          <p:cNvPr id="3" name="Content Placeholder 2"/>
+          <p:cNvSpPr>
+            <a:spLocks noGrp="1"/>
+          </p:cNvSpPr>
+          <p:nvPr>
+            <p:ph sz="quarter" idx="1"/>
+          </p:nvPr>
+        </p:nvSpPr>
+        <p:spPr/>
+        <p:txBody>
+          <a:bodyPr/>
+          <a:lstStyle/>
+          <a:p>
+            <a:r>
+              <a:rPr lang="pt-BR" dirty="0" smtClean="0"/>
+              <a:t>Robô X80 pronto para uso</a:t>
+            </a:r>
+          </a:p>
+          <a:p>
+            <a:endParaRPr lang="pt-BR" dirty="0" smtClean="0"/>
+          </a:p>
+          <a:p>
+            <a:r>
+              <a:rPr lang="pt-BR" dirty="0" smtClean="0"/>
+              <a:t>Foco no desenvolvimento do algoritmo</a:t>
+            </a:r>
+          </a:p>
+          <a:p>
+            <a:endParaRPr lang="pt-BR" dirty="0" smtClean="0"/>
+          </a:p>
+          <a:p>
+            <a:r>
+              <a:rPr lang="pt-BR" dirty="0" smtClean="0"/>
+              <a:t>Robô X80 indisponível</a:t>
+            </a:r>
+          </a:p>
+          <a:p>
+            <a:endParaRPr lang="pt-BR" dirty="0" smtClean="0"/>
+          </a:p>
+          <a:p>
+            <a:r>
+              <a:rPr lang="pt-BR" dirty="0" smtClean="0"/>
+              <a:t>Robô Bellator adquirido para o projeto</a:t>
+            </a:r>
+          </a:p>
+          <a:p>
+            <a:endParaRPr lang="pt-BR" dirty="0" smtClean="0"/>
+          </a:p>
+        </p:txBody>
+      </p:sp>
+    </p:spTree>
+  </p:cSld>
+  <p:clrMapOvr>
+    <a:masterClrMapping/>
+  </p:clrMapOvr>
+</p:sld>
+</file>
+
+<file path=ppt/slides/slide19.xml><?xml version="1.0" encoding="utf-8"?>
+<p:sld xmlns:a="http://schemas.openxmlformats.org/drawingml/2006/main" xmlns:r="http://schemas.openxmlformats.org/officeDocument/2006/relationships" xmlns:p="http://schemas.openxmlformats.org/presentationml/2006/main">
+  <p:cSld>
+    <p:spTree>
+      <p:nvGrpSpPr>
+        <p:cNvPr id="1" name=""/>
+        <p:cNvGrpSpPr/>
+        <p:nvPr/>
+      </p:nvGrpSpPr>
+      <p:grpSpPr>
+        <a:xfrm>
+          <a:off x="0" y="0"/>
+          <a:ext cx="0" cy="0"/>
+          <a:chOff x="0" y="0"/>
+          <a:chExt cx="0" cy="0"/>
+        </a:xfrm>
+      </p:grpSpPr>
+      <p:sp>
+        <p:nvSpPr>
+          <p:cNvPr id="2" name="Title 1"/>
+          <p:cNvSpPr>
+            <a:spLocks noGrp="1"/>
+          </p:cNvSpPr>
+          <p:nvPr>
+            <p:ph type="title"/>
+          </p:nvPr>
+        </p:nvSpPr>
+        <p:spPr/>
+        <p:txBody>
+          <a:bodyPr/>
+          <a:lstStyle/>
+          <a:p>
+            <a:r>
+              <a:rPr lang="pt-BR" dirty="0" smtClean="0"/>
+              <a:t>Nova Situação</a:t>
+            </a:r>
+            <a:endParaRPr lang="en-US" dirty="0"/>
+          </a:p>
+        </p:txBody>
+      </p:sp>
+      <p:sp>
+        <p:nvSpPr>
+          <p:cNvPr id="3" name="Content Placeholder 2"/>
+          <p:cNvSpPr>
+            <a:spLocks noGrp="1"/>
+          </p:cNvSpPr>
+          <p:nvPr>
+            <p:ph sz="quarter" idx="1"/>
+          </p:nvPr>
+        </p:nvSpPr>
+        <p:spPr/>
+        <p:txBody>
+          <a:bodyPr/>
+          <a:lstStyle/>
+          <a:p>
+            <a:r>
+              <a:rPr lang="pt-BR" dirty="0" smtClean="0"/>
+              <a:t>Robô Bellator não estava pronto para uso</a:t>
+            </a:r>
+          </a:p>
+          <a:p>
+            <a:endParaRPr lang="pt-BR" dirty="0" smtClean="0"/>
+          </a:p>
+          <a:p>
+            <a:r>
+              <a:rPr lang="pt-BR" dirty="0" smtClean="0"/>
+              <a:t>Mudança do foco do projeto para o reparo da plataforma robótica</a:t>
+            </a:r>
+          </a:p>
+          <a:p>
+            <a:endParaRPr lang="pt-BR" dirty="0" smtClean="0"/>
+          </a:p>
+          <a:p>
+            <a:r>
+              <a:rPr lang="pt-BR" dirty="0" smtClean="0"/>
+              <a:t>Redução do tempo disponível para análise dos algoritmos</a:t>
+            </a:r>
+            <a:endParaRPr lang="en-US" dirty="0"/>
+          </a:p>
+        </p:txBody>
+      </p:sp>
+    </p:spTree>
+  </p:cSld>
+  <p:clrMapOvr>
+    <a:masterClrMapping/>
+  </p:clrMapOvr>
+</p:sld>
+</file>
+
 <file path=ppt/slides/slide2.xml><?xml version="1.0" encoding="utf-8"?>
 <p:sld xmlns:a="http://schemas.openxmlformats.org/drawingml/2006/main" xmlns:r="http://schemas.openxmlformats.org/officeDocument/2006/relationships" xmlns:p="http://schemas.openxmlformats.org/presentationml/2006/main">
   <p:cSld>
@@ -3987,6 +5038,95 @@
       </p:grpSpPr>
       <p:sp>
         <p:nvSpPr>
+          <p:cNvPr id="2" name="Título 1"/>
+          <p:cNvSpPr>
+            <a:spLocks noGrp="1"/>
+          </p:cNvSpPr>
+          <p:nvPr>
+            <p:ph type="title"/>
+          </p:nvPr>
+        </p:nvSpPr>
+        <p:spPr/>
+        <p:txBody>
+          <a:bodyPr/>
+          <a:lstStyle/>
+          <a:p>
+            <a:r>
+              <a:rPr lang="pt-BR" dirty="0" smtClean="0"/>
+              <a:t>Introdução</a:t>
+            </a:r>
+            <a:endParaRPr lang="pt-BR" dirty="0"/>
+          </a:p>
+        </p:txBody>
+      </p:sp>
+      <p:sp>
+        <p:nvSpPr>
+          <p:cNvPr id="3" name="Espaço Reservado para Conteúdo 2"/>
+          <p:cNvSpPr>
+            <a:spLocks noGrp="1"/>
+          </p:cNvSpPr>
+          <p:nvPr>
+            <p:ph sz="quarter" idx="1"/>
+          </p:nvPr>
+        </p:nvSpPr>
+        <p:spPr/>
+        <p:txBody>
+          <a:bodyPr/>
+          <a:lstStyle/>
+          <a:p>
+            <a:r>
+              <a:rPr lang="pt-BR" dirty="0" smtClean="0"/>
+              <a:t>Motivação</a:t>
+            </a:r>
+          </a:p>
+          <a:p>
+            <a:r>
+              <a:rPr lang="pt-BR" dirty="0" smtClean="0"/>
+              <a:t>Objetivos</a:t>
+            </a:r>
+          </a:p>
+          <a:p>
+            <a:r>
+              <a:rPr lang="pt-BR" dirty="0" smtClean="0"/>
+              <a:t>Metodologia</a:t>
+            </a:r>
+          </a:p>
+          <a:p>
+            <a:r>
+              <a:rPr lang="pt-BR" dirty="0" smtClean="0"/>
+              <a:t>Apresentação do Documento</a:t>
+            </a:r>
+            <a:endParaRPr lang="pt-BR" dirty="0"/>
+          </a:p>
+        </p:txBody>
+      </p:sp>
+    </p:spTree>
+  </p:cSld>
+  <p:clrMapOvr>
+    <a:masterClrMapping/>
+  </p:clrMapOvr>
+</p:sld>
+</file>
+
+<file path=ppt/slides/slide20.xml><?xml version="1.0" encoding="utf-8"?>
+<p:sld xmlns:a="http://schemas.openxmlformats.org/drawingml/2006/main" xmlns:r="http://schemas.openxmlformats.org/officeDocument/2006/relationships" xmlns:p="http://schemas.openxmlformats.org/presentationml/2006/main">
+  <p:cSld>
+    <p:spTree>
+      <p:nvGrpSpPr>
+        <p:cNvPr id="1" name=""/>
+        <p:cNvGrpSpPr/>
+        <p:nvPr/>
+      </p:nvGrpSpPr>
+      <p:grpSpPr>
+        <a:xfrm>
+          <a:off x="0" y="0"/>
+          <a:ext cx="0" cy="0"/>
+          <a:chOff x="0" y="0"/>
+          <a:chExt cx="0" cy="0"/>
+        </a:xfrm>
+      </p:grpSpPr>
+      <p:sp>
+        <p:nvSpPr>
           <p:cNvPr id="2" name="Title 1"/>
           <p:cNvSpPr>
             <a:spLocks noGrp="1"/>
@@ -4002,7 +5142,7 @@
           <a:p>
             <a:r>
               <a:rPr lang="pt-BR" dirty="0" smtClean="0"/>
-              <a:t>Situação Inicial</a:t>
+              <a:t>Situação Atual</a:t>
             </a:r>
             <a:endParaRPr lang="en-US" dirty="0"/>
           </a:p>
@@ -4025,25 +5165,134 @@
           <a:p>
             <a:r>
               <a:rPr lang="pt-BR" dirty="0" smtClean="0"/>
-              <a:t>Robô X80 pronto para uso</a:t>
-            </a:r>
-          </a:p>
-          <a:p>
+              <a:t>Plataforma robótica Bellator:</a:t>
+            </a:r>
+          </a:p>
+          <a:p>
+            <a:pPr lvl="1"/>
+            <a:r>
+              <a:rPr lang="pt-BR" dirty="0" smtClean="0"/>
+              <a:t>Código para Tratamento dos Encoders</a:t>
+            </a:r>
+          </a:p>
+          <a:p>
+            <a:pPr lvl="1"/>
+            <a:r>
+              <a:rPr lang="pt-BR" dirty="0" smtClean="0"/>
+              <a:t>Nova placa de roteamento com encoders</a:t>
+            </a:r>
+          </a:p>
+          <a:p>
+            <a:pPr lvl="1"/>
+            <a:r>
+              <a:rPr lang="pt-BR" dirty="0" smtClean="0"/>
+              <a:t>Nova placa para execução dos algoritmos – TS7260</a:t>
+            </a:r>
+          </a:p>
+          <a:p>
+            <a:pPr lvl="1"/>
+            <a:r>
+              <a:rPr lang="pt-BR" dirty="0" smtClean="0"/>
+              <a:t>Testes </a:t>
+            </a:r>
+            <a:r>
+              <a:rPr lang="pt-BR" smtClean="0"/>
+              <a:t>de Integração</a:t>
+            </a:r>
             <a:endParaRPr lang="pt-BR" dirty="0" smtClean="0"/>
           </a:p>
           <a:p>
-            <a:r>
-              <a:rPr lang="pt-BR" dirty="0" smtClean="0"/>
-              <a:t>Foco no desenvolvimento do algoritmo</a:t>
-            </a:r>
-          </a:p>
-          <a:p>
+            <a:pPr lvl="1"/>
             <a:endParaRPr lang="pt-BR" dirty="0" smtClean="0"/>
           </a:p>
           <a:p>
             <a:r>
               <a:rPr lang="pt-BR" dirty="0" smtClean="0"/>
-              <a:t>Robô X80 indisponível</a:t>
+              <a:t>Análise dos algoritmos:</a:t>
+            </a:r>
+          </a:p>
+          <a:p>
+            <a:pPr lvl="1"/>
+            <a:r>
+              <a:rPr lang="pt-BR" dirty="0" smtClean="0"/>
+              <a:t>TS-7260 possui ambiente de execução pronto</a:t>
+            </a:r>
+          </a:p>
+          <a:p>
+            <a:pPr lvl="1"/>
+            <a:r>
+              <a:rPr lang="pt-BR" dirty="0" smtClean="0"/>
+              <a:t>Preparo dos testes</a:t>
+            </a:r>
+          </a:p>
+        </p:txBody>
+      </p:sp>
+    </p:spTree>
+  </p:cSld>
+  <p:clrMapOvr>
+    <a:masterClrMapping/>
+  </p:clrMapOvr>
+</p:sld>
+</file>
+
+<file path=ppt/slides/slide21.xml><?xml version="1.0" encoding="utf-8"?>
+<p:sld xmlns:a="http://schemas.openxmlformats.org/drawingml/2006/main" xmlns:r="http://schemas.openxmlformats.org/officeDocument/2006/relationships" xmlns:p="http://schemas.openxmlformats.org/presentationml/2006/main">
+  <p:cSld>
+    <p:spTree>
+      <p:nvGrpSpPr>
+        <p:cNvPr id="1" name=""/>
+        <p:cNvGrpSpPr/>
+        <p:nvPr/>
+      </p:nvGrpSpPr>
+      <p:grpSpPr>
+        <a:xfrm>
+          <a:off x="0" y="0"/>
+          <a:ext cx="0" cy="0"/>
+          <a:chOff x="0" y="0"/>
+          <a:chExt cx="0" cy="0"/>
+        </a:xfrm>
+      </p:grpSpPr>
+      <p:sp>
+        <p:nvSpPr>
+          <p:cNvPr id="2" name="Title 1"/>
+          <p:cNvSpPr>
+            <a:spLocks noGrp="1"/>
+          </p:cNvSpPr>
+          <p:nvPr>
+            <p:ph type="title"/>
+          </p:nvPr>
+        </p:nvSpPr>
+        <p:spPr/>
+        <p:txBody>
+          <a:bodyPr/>
+          <a:lstStyle/>
+          <a:p>
+            <a:r>
+              <a:rPr lang="pt-BR" dirty="0" smtClean="0"/>
+              <a:t>Tarefas </a:t>
+            </a:r>
+            <a:endParaRPr lang="en-US" dirty="0"/>
+          </a:p>
+        </p:txBody>
+      </p:sp>
+      <p:sp>
+        <p:nvSpPr>
+          <p:cNvPr id="3" name="Content Placeholder 2"/>
+          <p:cNvSpPr>
+            <a:spLocks noGrp="1"/>
+          </p:cNvSpPr>
+          <p:nvPr>
+            <p:ph sz="quarter" idx="1"/>
+          </p:nvPr>
+        </p:nvSpPr>
+        <p:spPr/>
+        <p:txBody>
+          <a:bodyPr/>
+          <a:lstStyle/>
+          <a:p>
+            <a:r>
+              <a:rPr lang="pt-BR" dirty="0" smtClean="0"/>
+              <a:t>Montagem final do robô</a:t>
             </a:r>
           </a:p>
           <a:p>
@@ -4052,11 +5301,41 @@
           <a:p>
             <a:r>
               <a:rPr lang="pt-BR" dirty="0" smtClean="0"/>
-              <a:t>Robô Bellator adquirido para o projeto</a:t>
-            </a:r>
-          </a:p>
-          <a:p>
+              <a:t>Programação da TS-7260:</a:t>
+            </a:r>
+          </a:p>
+          <a:p>
+            <a:pPr lvl="1"/>
+            <a:r>
+              <a:rPr lang="pt-BR" dirty="0" smtClean="0"/>
+              <a:t>Código para comunicação entre a TS e a C8051F340</a:t>
+            </a:r>
+          </a:p>
+          <a:p>
+            <a:pPr lvl="1"/>
+            <a:r>
+              <a:rPr lang="pt-BR" dirty="0" smtClean="0"/>
+              <a:t>Compilação dos algoritmos de navegação para a TS</a:t>
+            </a:r>
+          </a:p>
+          <a:p>
+            <a:pPr lvl="1"/>
             <a:endParaRPr lang="pt-BR" dirty="0" smtClean="0"/>
+          </a:p>
+          <a:p>
+            <a:r>
+              <a:rPr lang="pt-BR" dirty="0" smtClean="0"/>
+              <a:t>Análise dos resultados</a:t>
+            </a:r>
+          </a:p>
+          <a:p>
+            <a:endParaRPr lang="pt-BR" dirty="0" smtClean="0"/>
+          </a:p>
+          <a:p>
+            <a:r>
+              <a:rPr lang="pt-BR" dirty="0" smtClean="0"/>
+              <a:t>Consolidação da Monografia</a:t>
+            </a:r>
           </a:p>
         </p:txBody>
       </p:sp>
@@ -4087,7 +5366,7 @@
       </p:grpSpPr>
       <p:sp>
         <p:nvSpPr>
-          <p:cNvPr id="2" name="Title 1"/>
+          <p:cNvPr id="2" name="Título 1"/>
           <p:cNvSpPr>
             <a:spLocks noGrp="1"/>
           </p:cNvSpPr>
@@ -4102,15 +5381,15 @@
           <a:p>
             <a:r>
               <a:rPr lang="pt-BR" dirty="0" smtClean="0"/>
-              <a:t>Nova Situação</a:t>
-            </a:r>
-            <a:endParaRPr lang="en-US" dirty="0"/>
-          </a:p>
-        </p:txBody>
-      </p:sp>
-      <p:sp>
-        <p:nvSpPr>
-          <p:cNvPr id="3" name="Content Placeholder 2"/>
+              <a:t>Motivação</a:t>
+            </a:r>
+            <a:endParaRPr lang="pt-BR" dirty="0"/>
+          </a:p>
+        </p:txBody>
+      </p:sp>
+      <p:sp>
+        <p:nvSpPr>
+          <p:cNvPr id="3" name="Espaço Reservado para Conteúdo 2"/>
           <p:cNvSpPr>
             <a:spLocks noGrp="1"/>
           </p:cNvSpPr>
@@ -4123,29 +5402,7 @@
           <a:bodyPr/>
           <a:lstStyle/>
           <a:p>
-            <a:r>
-              <a:rPr lang="pt-BR" dirty="0" smtClean="0"/>
-              <a:t>Robô Bellator não estava pronto para uso</a:t>
-            </a:r>
-          </a:p>
-          <a:p>
-            <a:endParaRPr lang="pt-BR" dirty="0" smtClean="0"/>
-          </a:p>
-          <a:p>
-            <a:r>
-              <a:rPr lang="pt-BR" dirty="0" smtClean="0"/>
-              <a:t>Mudança do foco do projeto para o reparo da plataforma robótica</a:t>
-            </a:r>
-          </a:p>
-          <a:p>
-            <a:endParaRPr lang="pt-BR" dirty="0" smtClean="0"/>
-          </a:p>
-          <a:p>
-            <a:r>
-              <a:rPr lang="pt-BR" dirty="0" smtClean="0"/>
-              <a:t>Redução do tempo disponível para análise dos algoritmos</a:t>
-            </a:r>
-            <a:endParaRPr lang="en-US" dirty="0"/>
+            <a:endParaRPr lang="pt-BR"/>
           </a:p>
         </p:txBody>
       </p:sp>
@@ -4176,7 +5433,7 @@
       </p:grpSpPr>
       <p:sp>
         <p:nvSpPr>
-          <p:cNvPr id="2" name="Title 1"/>
+          <p:cNvPr id="2" name="Título 1"/>
           <p:cNvSpPr>
             <a:spLocks noGrp="1"/>
           </p:cNvSpPr>
@@ -4191,15 +5448,15 @@
           <a:p>
             <a:r>
               <a:rPr lang="pt-BR" dirty="0" smtClean="0"/>
-              <a:t>Situação Atual</a:t>
-            </a:r>
-            <a:endParaRPr lang="en-US" dirty="0"/>
-          </a:p>
-        </p:txBody>
-      </p:sp>
-      <p:sp>
-        <p:nvSpPr>
-          <p:cNvPr id="3" name="Content Placeholder 2"/>
+              <a:t>Objetivos</a:t>
+            </a:r>
+            <a:endParaRPr lang="pt-BR" dirty="0"/>
+          </a:p>
+        </p:txBody>
+      </p:sp>
+      <p:sp>
+        <p:nvSpPr>
+          <p:cNvPr id="3" name="Espaço Reservado para Conteúdo 2"/>
           <p:cNvSpPr>
             <a:spLocks noGrp="1"/>
           </p:cNvSpPr>
@@ -4212,68 +5469,7 @@
           <a:bodyPr/>
           <a:lstStyle/>
           <a:p>
-            <a:r>
-              <a:rPr lang="pt-BR" dirty="0" smtClean="0"/>
-              <a:t>Plataforma robótica Bellator:</a:t>
-            </a:r>
-          </a:p>
-          <a:p>
-            <a:pPr lvl="1"/>
-            <a:r>
-              <a:rPr lang="pt-BR" dirty="0" smtClean="0"/>
-              <a:t>Código para Tratamento dos Encoders</a:t>
-            </a:r>
-          </a:p>
-          <a:p>
-            <a:pPr lvl="1"/>
-            <a:r>
-              <a:rPr lang="pt-BR" dirty="0" smtClean="0"/>
-              <a:t>Nova placa de roteamento com encoders</a:t>
-            </a:r>
-          </a:p>
-          <a:p>
-            <a:pPr lvl="1"/>
-            <a:r>
-              <a:rPr lang="pt-BR" dirty="0" smtClean="0"/>
-              <a:t>Nova placa para execução dos algoritmos – TS7260</a:t>
-            </a:r>
-          </a:p>
-          <a:p>
-            <a:pPr lvl="1"/>
-            <a:r>
-              <a:rPr lang="pt-BR" dirty="0" smtClean="0"/>
-              <a:t>Testes </a:t>
-            </a:r>
-            <a:r>
-              <a:rPr lang="pt-BR" smtClean="0"/>
-              <a:t>de Integração</a:t>
-            </a:r>
-            <a:endParaRPr lang="pt-BR" dirty="0" smtClean="0"/>
-          </a:p>
-          <a:p>
-            <a:pPr lvl="1"/>
-            <a:endParaRPr lang="pt-BR" dirty="0" smtClean="0"/>
-          </a:p>
-          <a:p>
-            <a:r>
-              <a:rPr lang="pt-BR" dirty="0" smtClean="0"/>
-              <a:t>Análise dos algoritmos:</a:t>
-            </a:r>
-          </a:p>
-          <a:p>
-            <a:pPr lvl="1"/>
-            <a:r>
-              <a:rPr lang="pt-BR" dirty="0" smtClean="0"/>
-              <a:t>TS-7260 possui ambiente de execução pronto</a:t>
-            </a:r>
-          </a:p>
-          <a:p>
-            <a:pPr lvl="1"/>
-            <a:r>
-              <a:rPr lang="pt-BR" dirty="0" smtClean="0"/>
-              <a:t>Preparo dos testes</a:t>
-            </a:r>
-            <a:endParaRPr lang="pt-BR" dirty="0" smtClean="0"/>
+            <a:endParaRPr lang="pt-BR"/>
           </a:p>
         </p:txBody>
       </p:sp>
@@ -4304,7 +5500,7 @@
       </p:grpSpPr>
       <p:sp>
         <p:nvSpPr>
-          <p:cNvPr id="2" name="Title 1"/>
+          <p:cNvPr id="2" name="Título 1"/>
           <p:cNvSpPr>
             <a:spLocks noGrp="1"/>
           </p:cNvSpPr>
@@ -4319,15 +5515,15 @@
           <a:p>
             <a:r>
               <a:rPr lang="pt-BR" dirty="0" smtClean="0"/>
-              <a:t>Tarefas </a:t>
-            </a:r>
-            <a:endParaRPr lang="en-US" dirty="0"/>
-          </a:p>
-        </p:txBody>
-      </p:sp>
-      <p:sp>
-        <p:nvSpPr>
-          <p:cNvPr id="3" name="Content Placeholder 2"/>
+              <a:t>Metodologia</a:t>
+            </a:r>
+            <a:endParaRPr lang="pt-BR" dirty="0"/>
+          </a:p>
+        </p:txBody>
+      </p:sp>
+      <p:sp>
+        <p:nvSpPr>
+          <p:cNvPr id="3" name="Espaço Reservado para Conteúdo 2"/>
           <p:cNvSpPr>
             <a:spLocks noGrp="1"/>
           </p:cNvSpPr>
@@ -4340,52 +5536,363 @@
           <a:bodyPr/>
           <a:lstStyle/>
           <a:p>
-            <a:r>
-              <a:rPr lang="pt-BR" dirty="0" smtClean="0"/>
-              <a:t>Montagem final do robô</a:t>
-            </a:r>
-          </a:p>
-          <a:p>
+            <a:endParaRPr lang="pt-BR"/>
+          </a:p>
+        </p:txBody>
+      </p:sp>
+    </p:spTree>
+  </p:cSld>
+  <p:clrMapOvr>
+    <a:masterClrMapping/>
+  </p:clrMapOvr>
+</p:sld>
+</file>
+
+<file path=ppt/slides/slide6.xml><?xml version="1.0" encoding="utf-8"?>
+<p:sld xmlns:a="http://schemas.openxmlformats.org/drawingml/2006/main" xmlns:r="http://schemas.openxmlformats.org/officeDocument/2006/relationships" xmlns:p="http://schemas.openxmlformats.org/presentationml/2006/main">
+  <p:cSld>
+    <p:spTree>
+      <p:nvGrpSpPr>
+        <p:cNvPr id="1" name=""/>
+        <p:cNvGrpSpPr/>
+        <p:nvPr/>
+      </p:nvGrpSpPr>
+      <p:grpSpPr>
+        <a:xfrm>
+          <a:off x="0" y="0"/>
+          <a:ext cx="0" cy="0"/>
+          <a:chOff x="0" y="0"/>
+          <a:chExt cx="0" cy="0"/>
+        </a:xfrm>
+      </p:grpSpPr>
+      <p:sp>
+        <p:nvSpPr>
+          <p:cNvPr id="2" name="Título 1"/>
+          <p:cNvSpPr>
+            <a:spLocks noGrp="1"/>
+          </p:cNvSpPr>
+          <p:nvPr>
+            <p:ph type="title"/>
+          </p:nvPr>
+        </p:nvSpPr>
+        <p:spPr/>
+        <p:txBody>
+          <a:bodyPr/>
+          <a:lstStyle/>
+          <a:p>
+            <a:r>
+              <a:rPr lang="pt-BR" dirty="0" smtClean="0"/>
+              <a:t>Apresentação do Documento</a:t>
+            </a:r>
+            <a:endParaRPr lang="pt-BR" dirty="0"/>
+          </a:p>
+        </p:txBody>
+      </p:sp>
+      <p:sp>
+        <p:nvSpPr>
+          <p:cNvPr id="3" name="Espaço Reservado para Conteúdo 2"/>
+          <p:cNvSpPr>
+            <a:spLocks noGrp="1"/>
+          </p:cNvSpPr>
+          <p:nvPr>
+            <p:ph sz="quarter" idx="1"/>
+          </p:nvPr>
+        </p:nvSpPr>
+        <p:spPr/>
+        <p:txBody>
+          <a:bodyPr/>
+          <a:lstStyle/>
+          <a:p>
+            <a:r>
+              <a:rPr lang="pt-BR" dirty="0" smtClean="0"/>
+              <a:t>Capítulo 1 – Introdução</a:t>
+            </a:r>
+          </a:p>
+          <a:p>
+            <a:r>
+              <a:rPr lang="pt-BR" dirty="0" smtClean="0"/>
+              <a:t>Capítulo 2 – </a:t>
+            </a:r>
+            <a:r>
+              <a:rPr lang="pt-BR" dirty="0" err="1" smtClean="0"/>
+              <a:t>Fuzzy</a:t>
+            </a:r>
             <a:endParaRPr lang="pt-BR" dirty="0" smtClean="0"/>
           </a:p>
           <a:p>
             <a:r>
               <a:rPr lang="pt-BR" dirty="0" smtClean="0"/>
-              <a:t>Programação da TS-7260:</a:t>
-            </a:r>
-          </a:p>
-          <a:p>
-            <a:pPr lvl="1"/>
-            <a:r>
-              <a:rPr lang="pt-BR" dirty="0" smtClean="0"/>
-              <a:t>Código para comunicação entre a TS e a C8051F340</a:t>
-            </a:r>
-          </a:p>
-          <a:p>
-            <a:pPr lvl="1"/>
-            <a:r>
-              <a:rPr lang="pt-BR" dirty="0" smtClean="0"/>
-              <a:t>Compilação dos algoritmos de navegação para a TS</a:t>
-            </a:r>
-          </a:p>
-          <a:p>
-            <a:pPr lvl="1"/>
-            <a:endParaRPr lang="pt-BR" dirty="0" smtClean="0"/>
-          </a:p>
-          <a:p>
-            <a:r>
-              <a:rPr lang="pt-BR" dirty="0" smtClean="0"/>
-              <a:t>Análise dos resultados</a:t>
-            </a:r>
-          </a:p>
-          <a:p>
-            <a:endParaRPr lang="pt-BR" dirty="0" smtClean="0"/>
-          </a:p>
-          <a:p>
-            <a:r>
-              <a:rPr lang="pt-BR" dirty="0" smtClean="0"/>
-              <a:t>Consolidação da Monografia</a:t>
-            </a:r>
+              <a:t>Capítulo 3 – </a:t>
+            </a:r>
+            <a:r>
+              <a:rPr lang="pt-BR" dirty="0" err="1" smtClean="0"/>
+              <a:t>Fuzzy</a:t>
+            </a:r>
+            <a:r>
+              <a:rPr lang="pt-BR" dirty="0" smtClean="0"/>
+              <a:t> </a:t>
+            </a:r>
+            <a:r>
+              <a:rPr lang="pt-BR" dirty="0" err="1" smtClean="0"/>
+              <a:t>Cognitive</a:t>
+            </a:r>
+            <a:r>
+              <a:rPr lang="pt-BR" dirty="0" smtClean="0"/>
+              <a:t> </a:t>
+            </a:r>
+            <a:r>
+              <a:rPr lang="pt-BR" dirty="0" err="1" smtClean="0"/>
+              <a:t>Maps</a:t>
+            </a:r>
+            <a:r>
+              <a:rPr lang="pt-BR" dirty="0" smtClean="0"/>
+              <a:t> (FCM)</a:t>
+            </a:r>
+          </a:p>
+          <a:p>
+            <a:r>
+              <a:rPr lang="pt-BR" dirty="0" smtClean="0"/>
+              <a:t>Capítulo 4 – Estado do Robô</a:t>
+            </a:r>
+          </a:p>
+          <a:p>
+            <a:r>
+              <a:rPr lang="pt-BR" dirty="0" smtClean="0"/>
+              <a:t>Capítulo 5 – Especificação do Robô</a:t>
+            </a:r>
+          </a:p>
+        </p:txBody>
+      </p:sp>
+    </p:spTree>
+  </p:cSld>
+  <p:clrMapOvr>
+    <a:masterClrMapping/>
+  </p:clrMapOvr>
+</p:sld>
+</file>
+
+<file path=ppt/slides/slide7.xml><?xml version="1.0" encoding="utf-8"?>
+<p:sld xmlns:a="http://schemas.openxmlformats.org/drawingml/2006/main" xmlns:r="http://schemas.openxmlformats.org/officeDocument/2006/relationships" xmlns:p="http://schemas.openxmlformats.org/presentationml/2006/main">
+  <p:cSld>
+    <p:spTree>
+      <p:nvGrpSpPr>
+        <p:cNvPr id="1" name=""/>
+        <p:cNvGrpSpPr/>
+        <p:nvPr/>
+      </p:nvGrpSpPr>
+      <p:grpSpPr>
+        <a:xfrm>
+          <a:off x="0" y="0"/>
+          <a:ext cx="0" cy="0"/>
+          <a:chOff x="0" y="0"/>
+          <a:chExt cx="0" cy="0"/>
+        </a:xfrm>
+      </p:grpSpPr>
+      <p:sp>
+        <p:nvSpPr>
+          <p:cNvPr id="2" name="Título 1"/>
+          <p:cNvSpPr>
+            <a:spLocks noGrp="1"/>
+          </p:cNvSpPr>
+          <p:nvPr>
+            <p:ph type="title"/>
+          </p:nvPr>
+        </p:nvSpPr>
+        <p:spPr/>
+        <p:txBody>
+          <a:bodyPr/>
+          <a:lstStyle/>
+          <a:p>
+            <a:r>
+              <a:rPr lang="pt-BR" dirty="0" err="1" smtClean="0"/>
+              <a:t>Fuzzy</a:t>
+            </a:r>
+            <a:endParaRPr lang="pt-BR" dirty="0"/>
+          </a:p>
+        </p:txBody>
+      </p:sp>
+      <p:sp>
+        <p:nvSpPr>
+          <p:cNvPr id="3" name="Espaço Reservado para Conteúdo 2"/>
+          <p:cNvSpPr>
+            <a:spLocks noGrp="1"/>
+          </p:cNvSpPr>
+          <p:nvPr>
+            <p:ph sz="quarter" idx="1"/>
+          </p:nvPr>
+        </p:nvSpPr>
+        <p:spPr/>
+        <p:txBody>
+          <a:bodyPr/>
+          <a:lstStyle/>
+          <a:p>
+            <a:r>
+              <a:rPr lang="pt-BR" dirty="0" smtClean="0"/>
+              <a:t>Considerações</a:t>
+            </a:r>
+            <a:endParaRPr lang="pt-BR" dirty="0"/>
+          </a:p>
+        </p:txBody>
+      </p:sp>
+    </p:spTree>
+  </p:cSld>
+  <p:clrMapOvr>
+    <a:masterClrMapping/>
+  </p:clrMapOvr>
+</p:sld>
+</file>
+
+<file path=ppt/slides/slide8.xml><?xml version="1.0" encoding="utf-8"?>
+<p:sld xmlns:a="http://schemas.openxmlformats.org/drawingml/2006/main" xmlns:r="http://schemas.openxmlformats.org/officeDocument/2006/relationships" xmlns:p="http://schemas.openxmlformats.org/presentationml/2006/main">
+  <p:cSld>
+    <p:spTree>
+      <p:nvGrpSpPr>
+        <p:cNvPr id="1" name=""/>
+        <p:cNvGrpSpPr/>
+        <p:nvPr/>
+      </p:nvGrpSpPr>
+      <p:grpSpPr>
+        <a:xfrm>
+          <a:off x="0" y="0"/>
+          <a:ext cx="0" cy="0"/>
+          <a:chOff x="0" y="0"/>
+          <a:chExt cx="0" cy="0"/>
+        </a:xfrm>
+      </p:grpSpPr>
+      <p:sp>
+        <p:nvSpPr>
+          <p:cNvPr id="2" name="Título 1"/>
+          <p:cNvSpPr>
+            <a:spLocks noGrp="1"/>
+          </p:cNvSpPr>
+          <p:nvPr>
+            <p:ph type="title"/>
+          </p:nvPr>
+        </p:nvSpPr>
+        <p:spPr/>
+        <p:txBody>
+          <a:bodyPr/>
+          <a:lstStyle/>
+          <a:p>
+            <a:r>
+              <a:rPr lang="pt-BR" dirty="0" err="1" smtClean="0"/>
+              <a:t>Fuzzy</a:t>
+            </a:r>
+            <a:r>
+              <a:rPr lang="pt-BR" dirty="0" smtClean="0"/>
+              <a:t> </a:t>
+            </a:r>
+            <a:r>
+              <a:rPr lang="pt-BR" dirty="0" err="1" smtClean="0"/>
+              <a:t>Cognitive</a:t>
+            </a:r>
+            <a:r>
+              <a:rPr lang="pt-BR" dirty="0" smtClean="0"/>
+              <a:t> </a:t>
+            </a:r>
+            <a:r>
+              <a:rPr lang="pt-BR" dirty="0" err="1" smtClean="0"/>
+              <a:t>Maps</a:t>
+            </a:r>
+            <a:r>
+              <a:rPr lang="pt-BR" dirty="0" smtClean="0"/>
+              <a:t> (FCM)</a:t>
+            </a:r>
+            <a:endParaRPr lang="pt-BR" dirty="0"/>
+          </a:p>
+        </p:txBody>
+      </p:sp>
+      <p:sp>
+        <p:nvSpPr>
+          <p:cNvPr id="3" name="Espaço Reservado para Conteúdo 2"/>
+          <p:cNvSpPr>
+            <a:spLocks noGrp="1"/>
+          </p:cNvSpPr>
+          <p:nvPr>
+            <p:ph sz="quarter" idx="1"/>
+          </p:nvPr>
+        </p:nvSpPr>
+        <p:spPr/>
+        <p:txBody>
+          <a:bodyPr/>
+          <a:lstStyle/>
+          <a:p>
+            <a:r>
+              <a:rPr lang="pt-BR" dirty="0" smtClean="0"/>
+              <a:t>Considerações</a:t>
+            </a:r>
+            <a:endParaRPr lang="pt-BR" dirty="0"/>
+          </a:p>
+        </p:txBody>
+      </p:sp>
+    </p:spTree>
+  </p:cSld>
+  <p:clrMapOvr>
+    <a:masterClrMapping/>
+  </p:clrMapOvr>
+</p:sld>
+</file>
+
+<file path=ppt/slides/slide9.xml><?xml version="1.0" encoding="utf-8"?>
+<p:sld xmlns:a="http://schemas.openxmlformats.org/drawingml/2006/main" xmlns:r="http://schemas.openxmlformats.org/officeDocument/2006/relationships" xmlns:p="http://schemas.openxmlformats.org/presentationml/2006/main">
+  <p:cSld>
+    <p:spTree>
+      <p:nvGrpSpPr>
+        <p:cNvPr id="1" name=""/>
+        <p:cNvGrpSpPr/>
+        <p:nvPr/>
+      </p:nvGrpSpPr>
+      <p:grpSpPr>
+        <a:xfrm>
+          <a:off x="0" y="0"/>
+          <a:ext cx="0" cy="0"/>
+          <a:chOff x="0" y="0"/>
+          <a:chExt cx="0" cy="0"/>
+        </a:xfrm>
+      </p:grpSpPr>
+      <p:sp>
+        <p:nvSpPr>
+          <p:cNvPr id="2" name="Título 1"/>
+          <p:cNvSpPr>
+            <a:spLocks noGrp="1"/>
+          </p:cNvSpPr>
+          <p:nvPr>
+            <p:ph type="title"/>
+          </p:nvPr>
+        </p:nvSpPr>
+        <p:spPr/>
+        <p:txBody>
+          <a:bodyPr/>
+          <a:lstStyle/>
+          <a:p>
+            <a:r>
+              <a:rPr lang="pt-BR" dirty="0" smtClean="0"/>
+              <a:t>Estado do Robô</a:t>
+            </a:r>
+            <a:endParaRPr lang="pt-BR" dirty="0"/>
+          </a:p>
+        </p:txBody>
+      </p:sp>
+      <p:sp>
+        <p:nvSpPr>
+          <p:cNvPr id="3" name="Espaço Reservado para Conteúdo 2"/>
+          <p:cNvSpPr>
+            <a:spLocks noGrp="1"/>
+          </p:cNvSpPr>
+          <p:nvPr>
+            <p:ph sz="quarter" idx="1"/>
+          </p:nvPr>
+        </p:nvSpPr>
+        <p:spPr/>
+        <p:txBody>
+          <a:bodyPr/>
+          <a:lstStyle/>
+          <a:p>
+            <a:r>
+              <a:rPr lang="pt-BR" dirty="0" smtClean="0"/>
+              <a:t>Considerações</a:t>
+            </a:r>
+            <a:endParaRPr lang="pt-BR" dirty="0"/>
           </a:p>
         </p:txBody>
       </p:sp>

</xml_diff>

<commit_message>
-Completei o capítulo de FCM
</commit_message>
<xml_diff>
--- a/qualificacao.pptx
+++ b/qualificacao.pptx
@@ -13,19 +13,23 @@
     <p:sldId id="275" r:id="rId7"/>
     <p:sldId id="262" r:id="rId8"/>
     <p:sldId id="265" r:id="rId9"/>
-    <p:sldId id="263" r:id="rId10"/>
-    <p:sldId id="264" r:id="rId11"/>
-    <p:sldId id="276" r:id="rId12"/>
-    <p:sldId id="277" r:id="rId13"/>
-    <p:sldId id="278" r:id="rId14"/>
-    <p:sldId id="279" r:id="rId15"/>
-    <p:sldId id="267" r:id="rId16"/>
-    <p:sldId id="270" r:id="rId17"/>
-    <p:sldId id="271" r:id="rId18"/>
-    <p:sldId id="257" r:id="rId19"/>
-    <p:sldId id="258" r:id="rId20"/>
-    <p:sldId id="259" r:id="rId21"/>
-    <p:sldId id="260" r:id="rId22"/>
+    <p:sldId id="280" r:id="rId10"/>
+    <p:sldId id="281" r:id="rId11"/>
+    <p:sldId id="282" r:id="rId12"/>
+    <p:sldId id="283" r:id="rId13"/>
+    <p:sldId id="263" r:id="rId14"/>
+    <p:sldId id="264" r:id="rId15"/>
+    <p:sldId id="276" r:id="rId16"/>
+    <p:sldId id="277" r:id="rId17"/>
+    <p:sldId id="278" r:id="rId18"/>
+    <p:sldId id="279" r:id="rId19"/>
+    <p:sldId id="267" r:id="rId20"/>
+    <p:sldId id="270" r:id="rId21"/>
+    <p:sldId id="271" r:id="rId22"/>
+    <p:sldId id="257" r:id="rId23"/>
+    <p:sldId id="258" r:id="rId24"/>
+    <p:sldId id="259" r:id="rId25"/>
+    <p:sldId id="260" r:id="rId26"/>
   </p:sldIdLst>
   <p:sldSz cx="9144000" cy="6858000" type="screen4x3"/>
   <p:notesSz cx="6858000" cy="9144000"/>
@@ -4018,7 +4022,7 @@
           <a:p>
             <a:r>
               <a:rPr lang="pt-BR" dirty="0" smtClean="0"/>
-              <a:t>Especificação do Robô</a:t>
+              <a:t>Estrutura</a:t>
             </a:r>
             <a:endParaRPr lang="pt-BR" dirty="0"/>
           </a:p>
@@ -4041,64 +4045,56 @@
           <a:p>
             <a:r>
               <a:rPr lang="pt-BR" dirty="0" smtClean="0"/>
-              <a:t>Sensor IR 2Y0A02F98</a:t>
-            </a:r>
-          </a:p>
-          <a:p>
-            <a:r>
-              <a:rPr lang="pt-BR" dirty="0" err="1" smtClean="0"/>
-              <a:t>Microcontrolador</a:t>
-            </a:r>
-            <a:r>
-              <a:rPr lang="pt-BR" dirty="0" smtClean="0"/>
-              <a:t> C8051F340DK</a:t>
-            </a:r>
-          </a:p>
-          <a:p>
-            <a:r>
-              <a:rPr lang="pt-BR" dirty="0" err="1" smtClean="0"/>
-              <a:t>Encoder</a:t>
-            </a:r>
-            <a:r>
-              <a:rPr lang="pt-BR" dirty="0" smtClean="0"/>
-              <a:t> </a:t>
-            </a:r>
-            <a:r>
-              <a:rPr lang="pt-BR" dirty="0" smtClean="0"/>
-              <a:t>HEDS-9700</a:t>
-            </a:r>
-          </a:p>
-          <a:p>
-            <a:r>
-              <a:rPr lang="pt-BR" dirty="0" smtClean="0"/>
-              <a:t>Robô </a:t>
-            </a:r>
-            <a:r>
-              <a:rPr lang="pt-BR" dirty="0" err="1" smtClean="0"/>
-              <a:t>Bellator</a:t>
-            </a:r>
-            <a:endParaRPr lang="pt-BR" dirty="0" smtClean="0"/>
-          </a:p>
-          <a:p>
-            <a:r>
-              <a:rPr lang="pt-BR" dirty="0" smtClean="0"/>
-              <a:t>Placa de </a:t>
-            </a:r>
-            <a:r>
-              <a:rPr lang="pt-BR" dirty="0" err="1" smtClean="0"/>
-              <a:t>Roteamento</a:t>
-            </a:r>
-            <a:endParaRPr lang="pt-BR" dirty="0" smtClean="0"/>
-          </a:p>
-          <a:p>
-            <a:r>
-              <a:rPr lang="pt-BR" dirty="0" smtClean="0"/>
-              <a:t>Considerações</a:t>
+              <a:t>Grafo direcionado</a:t>
+            </a:r>
+          </a:p>
+          <a:p>
+            <a:r>
+              <a:rPr lang="pt-BR" dirty="0" smtClean="0"/>
+              <a:t>Pesos “ajustáveis”</a:t>
+            </a:r>
+          </a:p>
+          <a:p>
+            <a:r>
+              <a:rPr lang="pt-BR" dirty="0" smtClean="0"/>
+              <a:t>Nós são conceitos</a:t>
+            </a:r>
+          </a:p>
+          <a:p>
+            <a:r>
+              <a:rPr lang="pt-BR" dirty="0" smtClean="0"/>
+              <a:t>Arestas são relações de causa e efeito </a:t>
             </a:r>
             <a:endParaRPr lang="pt-BR" dirty="0"/>
           </a:p>
         </p:txBody>
       </p:sp>
+      <p:pic>
+        <p:nvPicPr>
+          <p:cNvPr id="5121" name="Picture 1" descr="D:\10o Semestre\TCC\monografia-tex\figs\fcm.PNG"/>
+          <p:cNvPicPr>
+            <a:picLocks noChangeAspect="1" noChangeArrowheads="1"/>
+          </p:cNvPicPr>
+          <p:nvPr/>
+        </p:nvPicPr>
+        <p:blipFill>
+          <a:blip r:embed="rId2" cstate="print"/>
+          <a:srcRect/>
+          <a:stretch>
+            <a:fillRect/>
+          </a:stretch>
+        </p:blipFill>
+        <p:spPr bwMode="auto">
+          <a:xfrm>
+            <a:off x="2438400" y="3352800"/>
+            <a:ext cx="5392946" cy="3352800"/>
+          </a:xfrm>
+          <a:prstGeom prst="rect">
+            <a:avLst/>
+          </a:prstGeom>
+          <a:noFill/>
+        </p:spPr>
+      </p:pic>
     </p:spTree>
   </p:cSld>
   <p:clrMapOvr>
@@ -4141,7 +4137,7 @@
           <a:p>
             <a:r>
               <a:rPr lang="pt-BR" dirty="0" smtClean="0"/>
-              <a:t>Sensor IR 2Y0A02F98</a:t>
+              <a:t>Propriedades</a:t>
             </a:r>
             <a:endParaRPr lang="pt-BR" dirty="0"/>
           </a:p>
@@ -4162,7 +4158,17 @@
           <a:bodyPr/>
           <a:lstStyle/>
           <a:p>
-            <a:endParaRPr lang="pt-BR"/>
+            <a:r>
+              <a:rPr lang="pt-BR" dirty="0" smtClean="0"/>
+              <a:t>Elasticidade</a:t>
+            </a:r>
+          </a:p>
+          <a:p>
+            <a:r>
+              <a:rPr lang="pt-BR" dirty="0" smtClean="0"/>
+              <a:t>Estabilidade</a:t>
+            </a:r>
+            <a:endParaRPr lang="pt-BR" dirty="0"/>
           </a:p>
         </p:txBody>
       </p:sp>
@@ -4207,33 +4213,46 @@
           <a:lstStyle/>
           <a:p>
             <a:r>
+              <a:rPr lang="pt-BR" dirty="0" smtClean="0"/>
+              <a:t>Vantagens</a:t>
+            </a:r>
+            <a:endParaRPr lang="pt-BR" dirty="0"/>
+          </a:p>
+        </p:txBody>
+      </p:sp>
+      <p:sp>
+        <p:nvSpPr>
+          <p:cNvPr id="3" name="Espaço Reservado para Conteúdo 2"/>
+          <p:cNvSpPr>
+            <a:spLocks noGrp="1"/>
+          </p:cNvSpPr>
+          <p:nvPr>
+            <p:ph sz="quarter" idx="1"/>
+          </p:nvPr>
+        </p:nvSpPr>
+        <p:spPr/>
+        <p:txBody>
+          <a:bodyPr/>
+          <a:lstStyle/>
+          <a:p>
+            <a:r>
+              <a:rPr lang="pt-BR" dirty="0" smtClean="0"/>
+              <a:t>Interatividade entre conceitos</a:t>
+            </a:r>
+          </a:p>
+          <a:p>
+            <a:r>
               <a:rPr lang="pt-BR" dirty="0" err="1" smtClean="0"/>
-              <a:t>Microcontrolador</a:t>
-            </a:r>
-            <a:r>
-              <a:rPr lang="pt-BR" dirty="0" smtClean="0"/>
-              <a:t> C8051F340DK</a:t>
+              <a:t>Modularidade</a:t>
+            </a:r>
+            <a:endParaRPr lang="pt-BR" dirty="0" smtClean="0"/>
+          </a:p>
+          <a:p>
+            <a:r>
+              <a:rPr lang="pt-BR" dirty="0" smtClean="0"/>
+              <a:t>Treinamento</a:t>
             </a:r>
             <a:endParaRPr lang="pt-BR" dirty="0"/>
-          </a:p>
-        </p:txBody>
-      </p:sp>
-      <p:sp>
-        <p:nvSpPr>
-          <p:cNvPr id="3" name="Espaço Reservado para Conteúdo 2"/>
-          <p:cNvSpPr>
-            <a:spLocks noGrp="1"/>
-          </p:cNvSpPr>
-          <p:nvPr>
-            <p:ph sz="quarter" idx="1"/>
-          </p:nvPr>
-        </p:nvSpPr>
-        <p:spPr/>
-        <p:txBody>
-          <a:bodyPr/>
-          <a:lstStyle/>
-          <a:p>
-            <a:endParaRPr lang="pt-BR"/>
           </a:p>
         </p:txBody>
       </p:sp>
@@ -4278,12 +4297,8 @@
           <a:lstStyle/>
           <a:p>
             <a:r>
-              <a:rPr lang="pt-BR" dirty="0" err="1" smtClean="0"/>
-              <a:t>Encoder</a:t>
-            </a:r>
-            <a:r>
-              <a:rPr lang="pt-BR" dirty="0" smtClean="0"/>
-              <a:t> HEDS-9700</a:t>
+              <a:rPr lang="pt-BR" dirty="0" smtClean="0"/>
+              <a:t>Estado do Robô</a:t>
             </a:r>
             <a:endParaRPr lang="pt-BR" dirty="0"/>
           </a:p>
@@ -4305,101 +4320,13 @@
           <a:lstStyle/>
           <a:p>
             <a:r>
-              <a:rPr lang="pt-BR" dirty="0" err="1" smtClean="0"/>
-              <a:t>Encoder</a:t>
-            </a:r>
-            <a:r>
-              <a:rPr lang="pt-BR" dirty="0" smtClean="0"/>
-              <a:t> de quadratura (2 canais)</a:t>
-            </a:r>
-          </a:p>
-          <a:p>
-            <a:r>
-              <a:rPr lang="pt-BR" dirty="0" smtClean="0"/>
-              <a:t>Baixo custo</a:t>
-            </a:r>
-          </a:p>
-          <a:p>
-            <a:r>
-              <a:rPr lang="pt-BR" dirty="0" smtClean="0"/>
-              <a:t>Não precisa tratar o sinal</a:t>
-            </a:r>
-          </a:p>
-          <a:p>
-            <a:r>
-              <a:rPr lang="pt-BR" dirty="0" smtClean="0"/>
-              <a:t>Compatível com nível TTL</a:t>
-            </a:r>
-          </a:p>
-          <a:p>
+              <a:rPr lang="pt-BR" dirty="0" smtClean="0"/>
+              <a:t>Considerações</a:t>
+            </a:r>
             <a:endParaRPr lang="pt-BR" dirty="0"/>
           </a:p>
         </p:txBody>
       </p:sp>
-      <p:pic>
-        <p:nvPicPr>
-          <p:cNvPr id="2050" name="Picture 2"/>
-          <p:cNvPicPr>
-            <a:picLocks noChangeAspect="1" noChangeArrowheads="1"/>
-          </p:cNvPicPr>
-          <p:nvPr/>
-        </p:nvPicPr>
-        <p:blipFill>
-          <a:blip r:embed="rId2" cstate="print"/>
-          <a:srcRect/>
-          <a:stretch>
-            <a:fillRect/>
-          </a:stretch>
-        </p:blipFill>
-        <p:spPr bwMode="auto">
-          <a:xfrm>
-            <a:off x="6629400" y="1295400"/>
-            <a:ext cx="2126202" cy="2066026"/>
-          </a:xfrm>
-          <a:prstGeom prst="rect">
-            <a:avLst/>
-          </a:prstGeom>
-          <a:noFill/>
-          <a:ln w="9525">
-            <a:noFill/>
-            <a:miter lim="800000"/>
-            <a:headEnd/>
-            <a:tailEnd/>
-          </a:ln>
-        </p:spPr>
-      </p:pic>
-      <p:pic>
-        <p:nvPicPr>
-          <p:cNvPr id="2051" name="Picture 3"/>
-          <p:cNvPicPr>
-            <a:picLocks noChangeAspect="1" noChangeArrowheads="1"/>
-          </p:cNvPicPr>
-          <p:nvPr/>
-        </p:nvPicPr>
-        <p:blipFill>
-          <a:blip r:embed="rId3" cstate="print"/>
-          <a:srcRect/>
-          <a:stretch>
-            <a:fillRect/>
-          </a:stretch>
-        </p:blipFill>
-        <p:spPr bwMode="auto">
-          <a:xfrm>
-            <a:off x="457200" y="3048000"/>
-            <a:ext cx="4721190" cy="3809046"/>
-          </a:xfrm>
-          <a:prstGeom prst="rect">
-            <a:avLst/>
-          </a:prstGeom>
-          <a:noFill/>
-          <a:ln w="9525">
-            <a:noFill/>
-            <a:miter lim="800000"/>
-            <a:headEnd/>
-            <a:tailEnd/>
-          </a:ln>
-        </p:spPr>
-      </p:pic>
     </p:spTree>
   </p:cSld>
   <p:clrMapOvr>
@@ -4442,39 +4369,87 @@
           <a:p>
             <a:r>
               <a:rPr lang="pt-BR" dirty="0" smtClean="0"/>
+              <a:t>Especificação do Robô</a:t>
+            </a:r>
+            <a:endParaRPr lang="pt-BR" dirty="0"/>
+          </a:p>
+        </p:txBody>
+      </p:sp>
+      <p:sp>
+        <p:nvSpPr>
+          <p:cNvPr id="3" name="Espaço Reservado para Conteúdo 2"/>
+          <p:cNvSpPr>
+            <a:spLocks noGrp="1"/>
+          </p:cNvSpPr>
+          <p:nvPr>
+            <p:ph sz="quarter" idx="1"/>
+          </p:nvPr>
+        </p:nvSpPr>
+        <p:spPr/>
+        <p:txBody>
+          <a:bodyPr/>
+          <a:lstStyle/>
+          <a:p>
+            <a:r>
+              <a:rPr lang="pt-BR" dirty="0" smtClean="0"/>
+              <a:t>Sensor IR 2Y0A02F98</a:t>
+            </a:r>
+          </a:p>
+          <a:p>
+            <a:r>
+              <a:rPr lang="pt-BR" dirty="0" err="1" smtClean="0"/>
+              <a:t>Microcontrolador</a:t>
+            </a:r>
+            <a:r>
+              <a:rPr lang="pt-BR" dirty="0" smtClean="0"/>
+              <a:t> C8051F340DK</a:t>
+            </a:r>
+          </a:p>
+          <a:p>
+            <a:r>
+              <a:rPr lang="pt-BR" dirty="0" err="1" smtClean="0"/>
+              <a:t>Encoder</a:t>
+            </a:r>
+            <a:r>
+              <a:rPr lang="pt-BR" dirty="0" smtClean="0"/>
+              <a:t> </a:t>
+            </a:r>
+            <a:r>
+              <a:rPr lang="pt-BR" dirty="0" smtClean="0"/>
+              <a:t>HEDS-9700</a:t>
+            </a:r>
+          </a:p>
+          <a:p>
+            <a:r>
+              <a:rPr lang="pt-BR" dirty="0" smtClean="0"/>
               <a:t>Robô </a:t>
             </a:r>
             <a:r>
               <a:rPr lang="pt-BR" dirty="0" err="1" smtClean="0"/>
               <a:t>Bellator</a:t>
             </a:r>
+            <a:endParaRPr lang="pt-BR" dirty="0" smtClean="0"/>
+          </a:p>
+          <a:p>
+            <a:r>
+              <a:rPr lang="pt-BR" dirty="0" smtClean="0"/>
+              <a:t>Placa de </a:t>
+            </a:r>
+            <a:r>
+              <a:rPr lang="pt-BR" dirty="0" err="1" smtClean="0"/>
+              <a:t>Roteamento</a:t>
+            </a:r>
+            <a:endParaRPr lang="pt-BR" dirty="0" smtClean="0"/>
+          </a:p>
+          <a:p>
+            <a:r>
+              <a:rPr lang="pt-BR" dirty="0" smtClean="0"/>
+              <a:t>Considerações</a:t>
+            </a:r>
             <a:endParaRPr lang="pt-BR" dirty="0"/>
           </a:p>
         </p:txBody>
       </p:sp>
-      <p:pic>
-        <p:nvPicPr>
-          <p:cNvPr id="4" name="Espaço Reservado para Conteúdo 3" descr="Foto-0002.jpg"/>
-          <p:cNvPicPr>
-            <a:picLocks noGrp="1" noChangeAspect="1"/>
-          </p:cNvPicPr>
-          <p:nvPr>
-            <p:ph sz="quarter" idx="1"/>
-          </p:nvPr>
-        </p:nvPicPr>
-        <p:blipFill>
-          <a:blip r:embed="rId2" cstate="print"/>
-          <a:stretch>
-            <a:fillRect/>
-          </a:stretch>
-        </p:blipFill>
-        <p:spPr>
-          <a:xfrm>
-            <a:off x="1280583" y="1219200"/>
-            <a:ext cx="6582833" cy="4937125"/>
-          </a:xfrm>
-        </p:spPr>
-      </p:pic>
     </p:spTree>
   </p:cSld>
   <p:clrMapOvr>
@@ -4517,11 +4492,7 @@
           <a:p>
             <a:r>
               <a:rPr lang="pt-BR" dirty="0" smtClean="0"/>
-              <a:t>Placa de </a:t>
-            </a:r>
-            <a:r>
-              <a:rPr lang="pt-BR" dirty="0" err="1" smtClean="0"/>
-              <a:t>Roteamento</a:t>
+              <a:t>Sensor IR 2Y0A02F98</a:t>
             </a:r>
             <a:endParaRPr lang="pt-BR" dirty="0"/>
           </a:p>
@@ -4542,17 +4513,7 @@
           <a:bodyPr/>
           <a:lstStyle/>
           <a:p>
-            <a:r>
-              <a:rPr lang="pt-BR" dirty="0" smtClean="0"/>
-              <a:t>Projeto</a:t>
-            </a:r>
-          </a:p>
-          <a:p>
-            <a:r>
-              <a:rPr lang="pt-BR" dirty="0" smtClean="0"/>
-              <a:t>Montagem</a:t>
-            </a:r>
-            <a:endParaRPr lang="pt-BR" dirty="0"/>
+            <a:endParaRPr lang="pt-BR"/>
           </a:p>
         </p:txBody>
       </p:sp>
@@ -4597,8 +4558,12 @@
           <a:lstStyle/>
           <a:p>
             <a:r>
-              <a:rPr lang="pt-BR" dirty="0" smtClean="0"/>
-              <a:t>Projeto</a:t>
+              <a:rPr lang="pt-BR" dirty="0" err="1" smtClean="0"/>
+              <a:t>Microcontrolador</a:t>
+            </a:r>
+            <a:r>
+              <a:rPr lang="pt-BR" dirty="0" smtClean="0"/>
+              <a:t> C8051F340DK</a:t>
             </a:r>
             <a:endParaRPr lang="pt-BR" dirty="0"/>
           </a:p>
@@ -4664,142 +4629,74 @@
           <a:lstStyle/>
           <a:p>
             <a:r>
-              <a:rPr lang="pt-BR" dirty="0" smtClean="0"/>
-              <a:t>Montagem</a:t>
-            </a:r>
+              <a:rPr lang="pt-BR" dirty="0" err="1" smtClean="0"/>
+              <a:t>Encoder</a:t>
+            </a:r>
+            <a:r>
+              <a:rPr lang="pt-BR" dirty="0" smtClean="0"/>
+              <a:t> HEDS-9700</a:t>
+            </a:r>
+            <a:endParaRPr lang="pt-BR" dirty="0"/>
+          </a:p>
+        </p:txBody>
+      </p:sp>
+      <p:sp>
+        <p:nvSpPr>
+          <p:cNvPr id="3" name="Espaço Reservado para Conteúdo 2"/>
+          <p:cNvSpPr>
+            <a:spLocks noGrp="1"/>
+          </p:cNvSpPr>
+          <p:nvPr>
+            <p:ph sz="quarter" idx="1"/>
+          </p:nvPr>
+        </p:nvSpPr>
+        <p:spPr/>
+        <p:txBody>
+          <a:bodyPr/>
+          <a:lstStyle/>
+          <a:p>
+            <a:r>
+              <a:rPr lang="pt-BR" dirty="0" err="1" smtClean="0"/>
+              <a:t>Encoder</a:t>
+            </a:r>
+            <a:r>
+              <a:rPr lang="pt-BR" dirty="0" smtClean="0"/>
+              <a:t> de quadratura (2 canais)</a:t>
+            </a:r>
+          </a:p>
+          <a:p>
+            <a:r>
+              <a:rPr lang="pt-BR" dirty="0" smtClean="0"/>
+              <a:t>Baixo custo</a:t>
+            </a:r>
+          </a:p>
+          <a:p>
+            <a:r>
+              <a:rPr lang="pt-BR" dirty="0" smtClean="0"/>
+              <a:t>Não precisa tratar o sinal</a:t>
+            </a:r>
+          </a:p>
+          <a:p>
+            <a:r>
+              <a:rPr lang="pt-BR" dirty="0" smtClean="0"/>
+              <a:t>Compatível com nível TTL</a:t>
+            </a:r>
+          </a:p>
+          <a:p>
             <a:endParaRPr lang="pt-BR" dirty="0"/>
           </a:p>
         </p:txBody>
       </p:sp>
       <p:pic>
         <p:nvPicPr>
-          <p:cNvPr id="4" name="Espaço Reservado para Conteúdo 3" descr="Foto-0072.jpg"/>
-          <p:cNvPicPr>
-            <a:picLocks noGrp="1" noChangeAspect="1"/>
-          </p:cNvPicPr>
-          <p:nvPr>
-            <p:ph sz="quarter" idx="1"/>
-          </p:nvPr>
-        </p:nvPicPr>
-        <p:blipFill>
-          <a:blip r:embed="rId2" cstate="print"/>
-          <a:stretch>
-            <a:fillRect/>
-          </a:stretch>
-        </p:blipFill>
-        <p:spPr>
-          <a:xfrm>
-            <a:off x="457200" y="1219200"/>
-            <a:ext cx="2743200" cy="2057400"/>
-          </a:xfrm>
-        </p:spPr>
-      </p:pic>
-      <p:pic>
-        <p:nvPicPr>
-          <p:cNvPr id="6" name="Imagem 5" descr="Foto-0078.jpg"/>
-          <p:cNvPicPr>
-            <a:picLocks noChangeAspect="1"/>
-          </p:cNvPicPr>
-          <p:nvPr/>
-        </p:nvPicPr>
-        <p:blipFill>
-          <a:blip r:embed="rId3" cstate="print"/>
-          <a:stretch>
-            <a:fillRect/>
-          </a:stretch>
-        </p:blipFill>
-        <p:spPr>
-          <a:xfrm>
-            <a:off x="6172200" y="1219200"/>
-            <a:ext cx="2743200" cy="2057400"/>
-          </a:xfrm>
-          <a:prstGeom prst="rect">
-            <a:avLst/>
-          </a:prstGeom>
-        </p:spPr>
-      </p:pic>
-      <p:pic>
-        <p:nvPicPr>
-          <p:cNvPr id="7" name="Imagem 6" descr="Foto-0077.jpg"/>
-          <p:cNvPicPr>
-            <a:picLocks noChangeAspect="1"/>
-          </p:cNvPicPr>
-          <p:nvPr/>
-        </p:nvPicPr>
-        <p:blipFill>
-          <a:blip r:embed="rId4" cstate="print"/>
-          <a:stretch>
-            <a:fillRect/>
-          </a:stretch>
-        </p:blipFill>
-        <p:spPr>
-          <a:xfrm>
-            <a:off x="3276600" y="1219200"/>
-            <a:ext cx="2743200" cy="2057400"/>
-          </a:xfrm>
-          <a:prstGeom prst="rect">
-            <a:avLst/>
-          </a:prstGeom>
-        </p:spPr>
-      </p:pic>
-      <p:pic>
-        <p:nvPicPr>
-          <p:cNvPr id="8" name="Imagem 7" descr="Foto-0079.jpg"/>
-          <p:cNvPicPr>
-            <a:picLocks noChangeAspect="1"/>
-          </p:cNvPicPr>
-          <p:nvPr/>
-        </p:nvPicPr>
-        <p:blipFill>
-          <a:blip r:embed="rId5" cstate="print"/>
-          <a:stretch>
-            <a:fillRect/>
-          </a:stretch>
-        </p:blipFill>
-        <p:spPr>
-          <a:xfrm>
-            <a:off x="457200" y="3429000"/>
-            <a:ext cx="3860800" cy="2895600"/>
-          </a:xfrm>
-          <a:prstGeom prst="rect">
-            <a:avLst/>
-          </a:prstGeom>
-        </p:spPr>
-      </p:pic>
-      <p:pic>
-        <p:nvPicPr>
-          <p:cNvPr id="9" name="Imagem 8" descr="Foto-0081.jpg"/>
-          <p:cNvPicPr>
-            <a:picLocks noChangeAspect="1"/>
-          </p:cNvPicPr>
-          <p:nvPr/>
-        </p:nvPicPr>
-        <p:blipFill>
-          <a:blip r:embed="rId6" cstate="print"/>
-          <a:stretch>
-            <a:fillRect/>
-          </a:stretch>
-        </p:blipFill>
-        <p:spPr>
-          <a:xfrm>
-            <a:off x="5105400" y="3429000"/>
-            <a:ext cx="3810000" cy="2857500"/>
-          </a:xfrm>
-          <a:prstGeom prst="rect">
-            <a:avLst/>
-          </a:prstGeom>
-        </p:spPr>
-      </p:pic>
-      <p:pic>
-        <p:nvPicPr>
-          <p:cNvPr id="1026" name="Picture 2"/>
+          <p:cNvPr id="2050" name="Picture 2"/>
           <p:cNvPicPr>
             <a:picLocks noChangeAspect="1" noChangeArrowheads="1"/>
           </p:cNvPicPr>
           <p:nvPr/>
         </p:nvPicPr>
         <p:blipFill>
-          <a:blip r:embed="rId7" cstate="print"/>
+          <a:blip r:embed="rId2" cstate="print"/>
           <a:srcRect/>
           <a:stretch>
             <a:fillRect/>
@@ -4807,8 +4704,40 @@
         </p:blipFill>
         <p:spPr bwMode="auto">
           <a:xfrm>
-            <a:off x="3124200" y="4724400"/>
-            <a:ext cx="2962179" cy="1957387"/>
+            <a:off x="6629400" y="1295400"/>
+            <a:ext cx="2126202" cy="2066026"/>
+          </a:xfrm>
+          <a:prstGeom prst="rect">
+            <a:avLst/>
+          </a:prstGeom>
+          <a:noFill/>
+          <a:ln w="9525">
+            <a:noFill/>
+            <a:miter lim="800000"/>
+            <a:headEnd/>
+            <a:tailEnd/>
+          </a:ln>
+        </p:spPr>
+      </p:pic>
+      <p:pic>
+        <p:nvPicPr>
+          <p:cNvPr id="2051" name="Picture 3"/>
+          <p:cNvPicPr>
+            <a:picLocks noChangeAspect="1" noChangeArrowheads="1"/>
+          </p:cNvPicPr>
+          <p:nvPr/>
+        </p:nvPicPr>
+        <p:blipFill>
+          <a:blip r:embed="rId3" cstate="print"/>
+          <a:srcRect/>
+          <a:stretch>
+            <a:fillRect/>
+          </a:stretch>
+        </p:blipFill>
+        <p:spPr bwMode="auto">
+          <a:xfrm>
+            <a:off x="457200" y="3048000"/>
+            <a:ext cx="4721190" cy="3809046"/>
           </a:xfrm>
           <a:prstGeom prst="rect">
             <a:avLst/>
@@ -4849,7 +4778,7 @@
       </p:grpSpPr>
       <p:sp>
         <p:nvSpPr>
-          <p:cNvPr id="2" name="Title 1"/>
+          <p:cNvPr id="2" name="Título 1"/>
           <p:cNvSpPr>
             <a:spLocks noGrp="1"/>
           </p:cNvSpPr>
@@ -4864,64 +4793,39 @@
           <a:p>
             <a:r>
               <a:rPr lang="pt-BR" dirty="0" smtClean="0"/>
-              <a:t>Situação Inicial</a:t>
-            </a:r>
-            <a:endParaRPr lang="en-US" dirty="0"/>
-          </a:p>
-        </p:txBody>
-      </p:sp>
-      <p:sp>
-        <p:nvSpPr>
-          <p:cNvPr id="3" name="Content Placeholder 2"/>
-          <p:cNvSpPr>
-            <a:spLocks noGrp="1"/>
-          </p:cNvSpPr>
+              <a:t>Robô </a:t>
+            </a:r>
+            <a:r>
+              <a:rPr lang="pt-BR" dirty="0" err="1" smtClean="0"/>
+              <a:t>Bellator</a:t>
+            </a:r>
+            <a:endParaRPr lang="pt-BR" dirty="0"/>
+          </a:p>
+        </p:txBody>
+      </p:sp>
+      <p:pic>
+        <p:nvPicPr>
+          <p:cNvPr id="4" name="Espaço Reservado para Conteúdo 3" descr="Foto-0002.jpg"/>
+          <p:cNvPicPr>
+            <a:picLocks noGrp="1" noChangeAspect="1"/>
+          </p:cNvPicPr>
           <p:nvPr>
             <p:ph sz="quarter" idx="1"/>
           </p:nvPr>
-        </p:nvSpPr>
-        <p:spPr/>
-        <p:txBody>
-          <a:bodyPr/>
-          <a:lstStyle/>
-          <a:p>
-            <a:r>
-              <a:rPr lang="pt-BR" dirty="0" smtClean="0"/>
-              <a:t>Robô X80 pronto para uso</a:t>
-            </a:r>
-          </a:p>
-          <a:p>
-            <a:endParaRPr lang="pt-BR" dirty="0" smtClean="0"/>
-          </a:p>
-          <a:p>
-            <a:r>
-              <a:rPr lang="pt-BR" dirty="0" smtClean="0"/>
-              <a:t>Foco no desenvolvimento do algoritmo</a:t>
-            </a:r>
-          </a:p>
-          <a:p>
-            <a:endParaRPr lang="pt-BR" dirty="0" smtClean="0"/>
-          </a:p>
-          <a:p>
-            <a:r>
-              <a:rPr lang="pt-BR" dirty="0" smtClean="0"/>
-              <a:t>Robô X80 indisponível</a:t>
-            </a:r>
-          </a:p>
-          <a:p>
-            <a:endParaRPr lang="pt-BR" dirty="0" smtClean="0"/>
-          </a:p>
-          <a:p>
-            <a:r>
-              <a:rPr lang="pt-BR" dirty="0" smtClean="0"/>
-              <a:t>Robô Bellator adquirido para o projeto</a:t>
-            </a:r>
-          </a:p>
-          <a:p>
-            <a:endParaRPr lang="pt-BR" dirty="0" smtClean="0"/>
-          </a:p>
-        </p:txBody>
-      </p:sp>
+        </p:nvPicPr>
+        <p:blipFill>
+          <a:blip r:embed="rId2" cstate="print"/>
+          <a:stretch>
+            <a:fillRect/>
+          </a:stretch>
+        </p:blipFill>
+        <p:spPr>
+          <a:xfrm>
+            <a:off x="1280583" y="1219200"/>
+            <a:ext cx="6582833" cy="4937125"/>
+          </a:xfrm>
+        </p:spPr>
+      </p:pic>
     </p:spTree>
   </p:cSld>
   <p:clrMapOvr>
@@ -4949,7 +4853,7 @@
       </p:grpSpPr>
       <p:sp>
         <p:nvSpPr>
-          <p:cNvPr id="2" name="Title 1"/>
+          <p:cNvPr id="2" name="Título 1"/>
           <p:cNvSpPr>
             <a:spLocks noGrp="1"/>
           </p:cNvSpPr>
@@ -4964,15 +4868,19 @@
           <a:p>
             <a:r>
               <a:rPr lang="pt-BR" dirty="0" smtClean="0"/>
-              <a:t>Nova Situação</a:t>
-            </a:r>
-            <a:endParaRPr lang="en-US" dirty="0"/>
-          </a:p>
-        </p:txBody>
-      </p:sp>
-      <p:sp>
-        <p:nvSpPr>
-          <p:cNvPr id="3" name="Content Placeholder 2"/>
+              <a:t>Placa de </a:t>
+            </a:r>
+            <a:r>
+              <a:rPr lang="pt-BR" dirty="0" err="1" smtClean="0"/>
+              <a:t>Roteamento</a:t>
+            </a:r>
+            <a:endParaRPr lang="pt-BR" dirty="0"/>
+          </a:p>
+        </p:txBody>
+      </p:sp>
+      <p:sp>
+        <p:nvSpPr>
+          <p:cNvPr id="3" name="Espaço Reservado para Conteúdo 2"/>
           <p:cNvSpPr>
             <a:spLocks noGrp="1"/>
           </p:cNvSpPr>
@@ -4987,27 +4895,15 @@
           <a:p>
             <a:r>
               <a:rPr lang="pt-BR" dirty="0" smtClean="0"/>
-              <a:t>Robô Bellator não estava pronto para uso</a:t>
-            </a:r>
-          </a:p>
-          <a:p>
-            <a:endParaRPr lang="pt-BR" dirty="0" smtClean="0"/>
-          </a:p>
-          <a:p>
-            <a:r>
-              <a:rPr lang="pt-BR" dirty="0" smtClean="0"/>
-              <a:t>Mudança do foco do projeto para o reparo da plataforma robótica</a:t>
-            </a:r>
-          </a:p>
-          <a:p>
-            <a:endParaRPr lang="pt-BR" dirty="0" smtClean="0"/>
-          </a:p>
-          <a:p>
-            <a:r>
-              <a:rPr lang="pt-BR" dirty="0" smtClean="0"/>
-              <a:t>Redução do tempo disponível para análise dos algoritmos</a:t>
-            </a:r>
-            <a:endParaRPr lang="en-US" dirty="0"/>
+              <a:t>Projeto</a:t>
+            </a:r>
+          </a:p>
+          <a:p>
+            <a:r>
+              <a:rPr lang="pt-BR" dirty="0" smtClean="0"/>
+              <a:t>Montagem</a:t>
+            </a:r>
+            <a:endParaRPr lang="pt-BR" dirty="0"/>
           </a:p>
         </p:txBody>
       </p:sp>
@@ -5127,7 +5023,7 @@
       </p:grpSpPr>
       <p:sp>
         <p:nvSpPr>
-          <p:cNvPr id="2" name="Title 1"/>
+          <p:cNvPr id="2" name="Título 1"/>
           <p:cNvSpPr>
             <a:spLocks noGrp="1"/>
           </p:cNvSpPr>
@@ -5142,15 +5038,15 @@
           <a:p>
             <a:r>
               <a:rPr lang="pt-BR" dirty="0" smtClean="0"/>
-              <a:t>Situação Atual</a:t>
-            </a:r>
-            <a:endParaRPr lang="en-US" dirty="0"/>
-          </a:p>
-        </p:txBody>
-      </p:sp>
-      <p:sp>
-        <p:nvSpPr>
-          <p:cNvPr id="3" name="Content Placeholder 2"/>
+              <a:t>Projeto</a:t>
+            </a:r>
+            <a:endParaRPr lang="pt-BR" dirty="0"/>
+          </a:p>
+        </p:txBody>
+      </p:sp>
+      <p:sp>
+        <p:nvSpPr>
+          <p:cNvPr id="3" name="Espaço Reservado para Conteúdo 2"/>
           <p:cNvSpPr>
             <a:spLocks noGrp="1"/>
           </p:cNvSpPr>
@@ -5163,67 +5059,7 @@
           <a:bodyPr/>
           <a:lstStyle/>
           <a:p>
-            <a:r>
-              <a:rPr lang="pt-BR" dirty="0" smtClean="0"/>
-              <a:t>Plataforma robótica Bellator:</a:t>
-            </a:r>
-          </a:p>
-          <a:p>
-            <a:pPr lvl="1"/>
-            <a:r>
-              <a:rPr lang="pt-BR" dirty="0" smtClean="0"/>
-              <a:t>Código para Tratamento dos Encoders</a:t>
-            </a:r>
-          </a:p>
-          <a:p>
-            <a:pPr lvl="1"/>
-            <a:r>
-              <a:rPr lang="pt-BR" dirty="0" smtClean="0"/>
-              <a:t>Nova placa de roteamento com encoders</a:t>
-            </a:r>
-          </a:p>
-          <a:p>
-            <a:pPr lvl="1"/>
-            <a:r>
-              <a:rPr lang="pt-BR" dirty="0" smtClean="0"/>
-              <a:t>Nova placa para execução dos algoritmos – TS7260</a:t>
-            </a:r>
-          </a:p>
-          <a:p>
-            <a:pPr lvl="1"/>
-            <a:r>
-              <a:rPr lang="pt-BR" dirty="0" smtClean="0"/>
-              <a:t>Testes </a:t>
-            </a:r>
-            <a:r>
-              <a:rPr lang="pt-BR" smtClean="0"/>
-              <a:t>de Integração</a:t>
-            </a:r>
-            <a:endParaRPr lang="pt-BR" dirty="0" smtClean="0"/>
-          </a:p>
-          <a:p>
-            <a:pPr lvl="1"/>
-            <a:endParaRPr lang="pt-BR" dirty="0" smtClean="0"/>
-          </a:p>
-          <a:p>
-            <a:r>
-              <a:rPr lang="pt-BR" dirty="0" smtClean="0"/>
-              <a:t>Análise dos algoritmos:</a:t>
-            </a:r>
-          </a:p>
-          <a:p>
-            <a:pPr lvl="1"/>
-            <a:r>
-              <a:rPr lang="pt-BR" dirty="0" smtClean="0"/>
-              <a:t>TS-7260 possui ambiente de execução pronto</a:t>
-            </a:r>
-          </a:p>
-          <a:p>
-            <a:pPr lvl="1"/>
-            <a:r>
-              <a:rPr lang="pt-BR" dirty="0" smtClean="0"/>
-              <a:t>Preparo dos testes</a:t>
-            </a:r>
+            <a:endParaRPr lang="pt-BR"/>
           </a:p>
         </p:txBody>
       </p:sp>
@@ -5254,6 +5090,521 @@
       </p:grpSpPr>
       <p:sp>
         <p:nvSpPr>
+          <p:cNvPr id="2" name="Título 1"/>
+          <p:cNvSpPr>
+            <a:spLocks noGrp="1"/>
+          </p:cNvSpPr>
+          <p:nvPr>
+            <p:ph type="title"/>
+          </p:nvPr>
+        </p:nvSpPr>
+        <p:spPr/>
+        <p:txBody>
+          <a:bodyPr/>
+          <a:lstStyle/>
+          <a:p>
+            <a:r>
+              <a:rPr lang="pt-BR" dirty="0" smtClean="0"/>
+              <a:t>Montagem</a:t>
+            </a:r>
+            <a:endParaRPr lang="pt-BR" dirty="0"/>
+          </a:p>
+        </p:txBody>
+      </p:sp>
+      <p:pic>
+        <p:nvPicPr>
+          <p:cNvPr id="4" name="Espaço Reservado para Conteúdo 3" descr="Foto-0072.jpg"/>
+          <p:cNvPicPr>
+            <a:picLocks noGrp="1" noChangeAspect="1"/>
+          </p:cNvPicPr>
+          <p:nvPr>
+            <p:ph sz="quarter" idx="1"/>
+          </p:nvPr>
+        </p:nvPicPr>
+        <p:blipFill>
+          <a:blip r:embed="rId2" cstate="print"/>
+          <a:stretch>
+            <a:fillRect/>
+          </a:stretch>
+        </p:blipFill>
+        <p:spPr>
+          <a:xfrm>
+            <a:off x="457200" y="1219200"/>
+            <a:ext cx="2743200" cy="2057400"/>
+          </a:xfrm>
+        </p:spPr>
+      </p:pic>
+      <p:pic>
+        <p:nvPicPr>
+          <p:cNvPr id="6" name="Imagem 5" descr="Foto-0078.jpg"/>
+          <p:cNvPicPr>
+            <a:picLocks noChangeAspect="1"/>
+          </p:cNvPicPr>
+          <p:nvPr/>
+        </p:nvPicPr>
+        <p:blipFill>
+          <a:blip r:embed="rId3" cstate="print"/>
+          <a:stretch>
+            <a:fillRect/>
+          </a:stretch>
+        </p:blipFill>
+        <p:spPr>
+          <a:xfrm>
+            <a:off x="6172200" y="1219200"/>
+            <a:ext cx="2743200" cy="2057400"/>
+          </a:xfrm>
+          <a:prstGeom prst="rect">
+            <a:avLst/>
+          </a:prstGeom>
+        </p:spPr>
+      </p:pic>
+      <p:pic>
+        <p:nvPicPr>
+          <p:cNvPr id="7" name="Imagem 6" descr="Foto-0077.jpg"/>
+          <p:cNvPicPr>
+            <a:picLocks noChangeAspect="1"/>
+          </p:cNvPicPr>
+          <p:nvPr/>
+        </p:nvPicPr>
+        <p:blipFill>
+          <a:blip r:embed="rId4" cstate="print"/>
+          <a:stretch>
+            <a:fillRect/>
+          </a:stretch>
+        </p:blipFill>
+        <p:spPr>
+          <a:xfrm>
+            <a:off x="3276600" y="1219200"/>
+            <a:ext cx="2743200" cy="2057400"/>
+          </a:xfrm>
+          <a:prstGeom prst="rect">
+            <a:avLst/>
+          </a:prstGeom>
+        </p:spPr>
+      </p:pic>
+      <p:pic>
+        <p:nvPicPr>
+          <p:cNvPr id="8" name="Imagem 7" descr="Foto-0079.jpg"/>
+          <p:cNvPicPr>
+            <a:picLocks noChangeAspect="1"/>
+          </p:cNvPicPr>
+          <p:nvPr/>
+        </p:nvPicPr>
+        <p:blipFill>
+          <a:blip r:embed="rId5" cstate="print"/>
+          <a:stretch>
+            <a:fillRect/>
+          </a:stretch>
+        </p:blipFill>
+        <p:spPr>
+          <a:xfrm>
+            <a:off x="457200" y="3429000"/>
+            <a:ext cx="3860800" cy="2895600"/>
+          </a:xfrm>
+          <a:prstGeom prst="rect">
+            <a:avLst/>
+          </a:prstGeom>
+        </p:spPr>
+      </p:pic>
+      <p:pic>
+        <p:nvPicPr>
+          <p:cNvPr id="9" name="Imagem 8" descr="Foto-0081.jpg"/>
+          <p:cNvPicPr>
+            <a:picLocks noChangeAspect="1"/>
+          </p:cNvPicPr>
+          <p:nvPr/>
+        </p:nvPicPr>
+        <p:blipFill>
+          <a:blip r:embed="rId6" cstate="print"/>
+          <a:stretch>
+            <a:fillRect/>
+          </a:stretch>
+        </p:blipFill>
+        <p:spPr>
+          <a:xfrm>
+            <a:off x="5105400" y="3429000"/>
+            <a:ext cx="3810000" cy="2857500"/>
+          </a:xfrm>
+          <a:prstGeom prst="rect">
+            <a:avLst/>
+          </a:prstGeom>
+        </p:spPr>
+      </p:pic>
+      <p:pic>
+        <p:nvPicPr>
+          <p:cNvPr id="1026" name="Picture 2"/>
+          <p:cNvPicPr>
+            <a:picLocks noChangeAspect="1" noChangeArrowheads="1"/>
+          </p:cNvPicPr>
+          <p:nvPr/>
+        </p:nvPicPr>
+        <p:blipFill>
+          <a:blip r:embed="rId7" cstate="print"/>
+          <a:srcRect/>
+          <a:stretch>
+            <a:fillRect/>
+          </a:stretch>
+        </p:blipFill>
+        <p:spPr bwMode="auto">
+          <a:xfrm>
+            <a:off x="3124200" y="4724400"/>
+            <a:ext cx="2962179" cy="1957387"/>
+          </a:xfrm>
+          <a:prstGeom prst="rect">
+            <a:avLst/>
+          </a:prstGeom>
+          <a:noFill/>
+          <a:ln w="9525">
+            <a:noFill/>
+            <a:miter lim="800000"/>
+            <a:headEnd/>
+            <a:tailEnd/>
+          </a:ln>
+        </p:spPr>
+      </p:pic>
+    </p:spTree>
+  </p:cSld>
+  <p:clrMapOvr>
+    <a:masterClrMapping/>
+  </p:clrMapOvr>
+</p:sld>
+</file>
+
+<file path=ppt/slides/slide22.xml><?xml version="1.0" encoding="utf-8"?>
+<p:sld xmlns:a="http://schemas.openxmlformats.org/drawingml/2006/main" xmlns:r="http://schemas.openxmlformats.org/officeDocument/2006/relationships" xmlns:p="http://schemas.openxmlformats.org/presentationml/2006/main">
+  <p:cSld>
+    <p:spTree>
+      <p:nvGrpSpPr>
+        <p:cNvPr id="1" name=""/>
+        <p:cNvGrpSpPr/>
+        <p:nvPr/>
+      </p:nvGrpSpPr>
+      <p:grpSpPr>
+        <a:xfrm>
+          <a:off x="0" y="0"/>
+          <a:ext cx="0" cy="0"/>
+          <a:chOff x="0" y="0"/>
+          <a:chExt cx="0" cy="0"/>
+        </a:xfrm>
+      </p:grpSpPr>
+      <p:sp>
+        <p:nvSpPr>
+          <p:cNvPr id="2" name="Title 1"/>
+          <p:cNvSpPr>
+            <a:spLocks noGrp="1"/>
+          </p:cNvSpPr>
+          <p:nvPr>
+            <p:ph type="title"/>
+          </p:nvPr>
+        </p:nvSpPr>
+        <p:spPr/>
+        <p:txBody>
+          <a:bodyPr/>
+          <a:lstStyle/>
+          <a:p>
+            <a:r>
+              <a:rPr lang="pt-BR" dirty="0" smtClean="0"/>
+              <a:t>Situação Inicial</a:t>
+            </a:r>
+            <a:endParaRPr lang="en-US" dirty="0"/>
+          </a:p>
+        </p:txBody>
+      </p:sp>
+      <p:sp>
+        <p:nvSpPr>
+          <p:cNvPr id="3" name="Content Placeholder 2"/>
+          <p:cNvSpPr>
+            <a:spLocks noGrp="1"/>
+          </p:cNvSpPr>
+          <p:nvPr>
+            <p:ph sz="quarter" idx="1"/>
+          </p:nvPr>
+        </p:nvSpPr>
+        <p:spPr/>
+        <p:txBody>
+          <a:bodyPr/>
+          <a:lstStyle/>
+          <a:p>
+            <a:r>
+              <a:rPr lang="pt-BR" dirty="0" smtClean="0"/>
+              <a:t>Robô X80 pronto para uso</a:t>
+            </a:r>
+          </a:p>
+          <a:p>
+            <a:endParaRPr lang="pt-BR" dirty="0" smtClean="0"/>
+          </a:p>
+          <a:p>
+            <a:r>
+              <a:rPr lang="pt-BR" dirty="0" smtClean="0"/>
+              <a:t>Foco no desenvolvimento do algoritmo</a:t>
+            </a:r>
+          </a:p>
+          <a:p>
+            <a:endParaRPr lang="pt-BR" dirty="0" smtClean="0"/>
+          </a:p>
+          <a:p>
+            <a:r>
+              <a:rPr lang="pt-BR" dirty="0" smtClean="0"/>
+              <a:t>Robô X80 indisponível</a:t>
+            </a:r>
+          </a:p>
+          <a:p>
+            <a:endParaRPr lang="pt-BR" dirty="0" smtClean="0"/>
+          </a:p>
+          <a:p>
+            <a:r>
+              <a:rPr lang="pt-BR" dirty="0" smtClean="0"/>
+              <a:t>Robô Bellator adquirido para o projeto</a:t>
+            </a:r>
+          </a:p>
+          <a:p>
+            <a:endParaRPr lang="pt-BR" dirty="0" smtClean="0"/>
+          </a:p>
+        </p:txBody>
+      </p:sp>
+    </p:spTree>
+  </p:cSld>
+  <p:clrMapOvr>
+    <a:masterClrMapping/>
+  </p:clrMapOvr>
+</p:sld>
+</file>
+
+<file path=ppt/slides/slide23.xml><?xml version="1.0" encoding="utf-8"?>
+<p:sld xmlns:a="http://schemas.openxmlformats.org/drawingml/2006/main" xmlns:r="http://schemas.openxmlformats.org/officeDocument/2006/relationships" xmlns:p="http://schemas.openxmlformats.org/presentationml/2006/main">
+  <p:cSld>
+    <p:spTree>
+      <p:nvGrpSpPr>
+        <p:cNvPr id="1" name=""/>
+        <p:cNvGrpSpPr/>
+        <p:nvPr/>
+      </p:nvGrpSpPr>
+      <p:grpSpPr>
+        <a:xfrm>
+          <a:off x="0" y="0"/>
+          <a:ext cx="0" cy="0"/>
+          <a:chOff x="0" y="0"/>
+          <a:chExt cx="0" cy="0"/>
+        </a:xfrm>
+      </p:grpSpPr>
+      <p:sp>
+        <p:nvSpPr>
+          <p:cNvPr id="2" name="Title 1"/>
+          <p:cNvSpPr>
+            <a:spLocks noGrp="1"/>
+          </p:cNvSpPr>
+          <p:nvPr>
+            <p:ph type="title"/>
+          </p:nvPr>
+        </p:nvSpPr>
+        <p:spPr/>
+        <p:txBody>
+          <a:bodyPr/>
+          <a:lstStyle/>
+          <a:p>
+            <a:r>
+              <a:rPr lang="pt-BR" dirty="0" smtClean="0"/>
+              <a:t>Nova Situação</a:t>
+            </a:r>
+            <a:endParaRPr lang="en-US" dirty="0"/>
+          </a:p>
+        </p:txBody>
+      </p:sp>
+      <p:sp>
+        <p:nvSpPr>
+          <p:cNvPr id="3" name="Content Placeholder 2"/>
+          <p:cNvSpPr>
+            <a:spLocks noGrp="1"/>
+          </p:cNvSpPr>
+          <p:nvPr>
+            <p:ph sz="quarter" idx="1"/>
+          </p:nvPr>
+        </p:nvSpPr>
+        <p:spPr/>
+        <p:txBody>
+          <a:bodyPr/>
+          <a:lstStyle/>
+          <a:p>
+            <a:r>
+              <a:rPr lang="pt-BR" dirty="0" smtClean="0"/>
+              <a:t>Robô Bellator não estava pronto para uso</a:t>
+            </a:r>
+          </a:p>
+          <a:p>
+            <a:endParaRPr lang="pt-BR" dirty="0" smtClean="0"/>
+          </a:p>
+          <a:p>
+            <a:r>
+              <a:rPr lang="pt-BR" dirty="0" smtClean="0"/>
+              <a:t>Mudança do foco do projeto para o reparo da plataforma robótica</a:t>
+            </a:r>
+          </a:p>
+          <a:p>
+            <a:endParaRPr lang="pt-BR" dirty="0" smtClean="0"/>
+          </a:p>
+          <a:p>
+            <a:r>
+              <a:rPr lang="pt-BR" dirty="0" smtClean="0"/>
+              <a:t>Redução do tempo disponível para análise dos algoritmos</a:t>
+            </a:r>
+            <a:endParaRPr lang="en-US" dirty="0"/>
+          </a:p>
+        </p:txBody>
+      </p:sp>
+    </p:spTree>
+  </p:cSld>
+  <p:clrMapOvr>
+    <a:masterClrMapping/>
+  </p:clrMapOvr>
+</p:sld>
+</file>
+
+<file path=ppt/slides/slide24.xml><?xml version="1.0" encoding="utf-8"?>
+<p:sld xmlns:a="http://schemas.openxmlformats.org/drawingml/2006/main" xmlns:r="http://schemas.openxmlformats.org/officeDocument/2006/relationships" xmlns:p="http://schemas.openxmlformats.org/presentationml/2006/main">
+  <p:cSld>
+    <p:spTree>
+      <p:nvGrpSpPr>
+        <p:cNvPr id="1" name=""/>
+        <p:cNvGrpSpPr/>
+        <p:nvPr/>
+      </p:nvGrpSpPr>
+      <p:grpSpPr>
+        <a:xfrm>
+          <a:off x="0" y="0"/>
+          <a:ext cx="0" cy="0"/>
+          <a:chOff x="0" y="0"/>
+          <a:chExt cx="0" cy="0"/>
+        </a:xfrm>
+      </p:grpSpPr>
+      <p:sp>
+        <p:nvSpPr>
+          <p:cNvPr id="2" name="Title 1"/>
+          <p:cNvSpPr>
+            <a:spLocks noGrp="1"/>
+          </p:cNvSpPr>
+          <p:nvPr>
+            <p:ph type="title"/>
+          </p:nvPr>
+        </p:nvSpPr>
+        <p:spPr/>
+        <p:txBody>
+          <a:bodyPr/>
+          <a:lstStyle/>
+          <a:p>
+            <a:r>
+              <a:rPr lang="pt-BR" dirty="0" smtClean="0"/>
+              <a:t>Situação Atual</a:t>
+            </a:r>
+            <a:endParaRPr lang="en-US" dirty="0"/>
+          </a:p>
+        </p:txBody>
+      </p:sp>
+      <p:sp>
+        <p:nvSpPr>
+          <p:cNvPr id="3" name="Content Placeholder 2"/>
+          <p:cNvSpPr>
+            <a:spLocks noGrp="1"/>
+          </p:cNvSpPr>
+          <p:nvPr>
+            <p:ph sz="quarter" idx="1"/>
+          </p:nvPr>
+        </p:nvSpPr>
+        <p:spPr/>
+        <p:txBody>
+          <a:bodyPr/>
+          <a:lstStyle/>
+          <a:p>
+            <a:r>
+              <a:rPr lang="pt-BR" dirty="0" smtClean="0"/>
+              <a:t>Plataforma robótica Bellator:</a:t>
+            </a:r>
+          </a:p>
+          <a:p>
+            <a:pPr lvl="1"/>
+            <a:r>
+              <a:rPr lang="pt-BR" dirty="0" smtClean="0"/>
+              <a:t>Código para Tratamento dos Encoders</a:t>
+            </a:r>
+          </a:p>
+          <a:p>
+            <a:pPr lvl="1"/>
+            <a:r>
+              <a:rPr lang="pt-BR" dirty="0" smtClean="0"/>
+              <a:t>Nova placa de roteamento com encoders</a:t>
+            </a:r>
+          </a:p>
+          <a:p>
+            <a:pPr lvl="1"/>
+            <a:r>
+              <a:rPr lang="pt-BR" dirty="0" smtClean="0"/>
+              <a:t>Nova placa para execução dos algoritmos – TS7260</a:t>
+            </a:r>
+          </a:p>
+          <a:p>
+            <a:pPr lvl="1"/>
+            <a:r>
+              <a:rPr lang="pt-BR" dirty="0" smtClean="0"/>
+              <a:t>Testes </a:t>
+            </a:r>
+            <a:r>
+              <a:rPr lang="pt-BR" smtClean="0"/>
+              <a:t>de Integração</a:t>
+            </a:r>
+            <a:endParaRPr lang="pt-BR" dirty="0" smtClean="0"/>
+          </a:p>
+          <a:p>
+            <a:pPr lvl="1"/>
+            <a:endParaRPr lang="pt-BR" dirty="0" smtClean="0"/>
+          </a:p>
+          <a:p>
+            <a:r>
+              <a:rPr lang="pt-BR" dirty="0" smtClean="0"/>
+              <a:t>Análise dos algoritmos:</a:t>
+            </a:r>
+          </a:p>
+          <a:p>
+            <a:pPr lvl="1"/>
+            <a:r>
+              <a:rPr lang="pt-BR" dirty="0" smtClean="0"/>
+              <a:t>TS-7260 possui ambiente de execução pronto</a:t>
+            </a:r>
+          </a:p>
+          <a:p>
+            <a:pPr lvl="1"/>
+            <a:r>
+              <a:rPr lang="pt-BR" dirty="0" smtClean="0"/>
+              <a:t>Preparo dos testes</a:t>
+            </a:r>
+          </a:p>
+        </p:txBody>
+      </p:sp>
+    </p:spTree>
+  </p:cSld>
+  <p:clrMapOvr>
+    <a:masterClrMapping/>
+  </p:clrMapOvr>
+</p:sld>
+</file>
+
+<file path=ppt/slides/slide25.xml><?xml version="1.0" encoding="utf-8"?>
+<p:sld xmlns:a="http://schemas.openxmlformats.org/drawingml/2006/main" xmlns:r="http://schemas.openxmlformats.org/officeDocument/2006/relationships" xmlns:p="http://schemas.openxmlformats.org/presentationml/2006/main">
+  <p:cSld>
+    <p:spTree>
+      <p:nvGrpSpPr>
+        <p:cNvPr id="1" name=""/>
+        <p:cNvGrpSpPr/>
+        <p:nvPr/>
+      </p:nvGrpSpPr>
+      <p:grpSpPr>
+        <a:xfrm>
+          <a:off x="0" y="0"/>
+          <a:ext cx="0" cy="0"/>
+          <a:chOff x="0" y="0"/>
+          <a:chExt cx="0" cy="0"/>
+        </a:xfrm>
+      </p:grpSpPr>
+      <p:sp>
+        <p:nvSpPr>
           <p:cNvPr id="2" name="Title 1"/>
           <p:cNvSpPr>
             <a:spLocks noGrp="1"/>
@@ -5819,9 +6170,26 @@
           <a:p>
             <a:r>
               <a:rPr lang="pt-BR" dirty="0" smtClean="0"/>
-              <a:t>Considerações</a:t>
-            </a:r>
-            <a:endParaRPr lang="pt-BR" dirty="0"/>
+              <a:t>Conceito</a:t>
+            </a:r>
+          </a:p>
+          <a:p>
+            <a:r>
+              <a:rPr lang="pt-BR" dirty="0" smtClean="0"/>
+              <a:t>Estrutura</a:t>
+            </a:r>
+          </a:p>
+          <a:p>
+            <a:r>
+              <a:rPr lang="pt-BR" dirty="0" smtClean="0"/>
+              <a:t>Propriedades</a:t>
+            </a:r>
+          </a:p>
+          <a:p>
+            <a:r>
+              <a:rPr lang="pt-BR" dirty="0" smtClean="0"/>
+              <a:t>Vantagens</a:t>
+            </a:r>
           </a:p>
         </p:txBody>
       </p:sp>
@@ -5867,7 +6235,7 @@
           <a:p>
             <a:r>
               <a:rPr lang="pt-BR" dirty="0" smtClean="0"/>
-              <a:t>Estado do Robô</a:t>
+              <a:t>Conceito</a:t>
             </a:r>
             <a:endParaRPr lang="pt-BR" dirty="0"/>
           </a:p>
@@ -5890,12 +6258,83 @@
           <a:p>
             <a:r>
               <a:rPr lang="pt-BR" dirty="0" smtClean="0"/>
-              <a:t>Considerações</a:t>
-            </a:r>
-            <a:endParaRPr lang="pt-BR" dirty="0"/>
-          </a:p>
-        </p:txBody>
-      </p:sp>
+              <a:t>Ligações entre palavras, idéias, tarefas ou outros itens</a:t>
+            </a:r>
+          </a:p>
+          <a:p>
+            <a:r>
+              <a:rPr lang="pt-BR" dirty="0" smtClean="0"/>
+              <a:t>Disposição radial e intuitiva dos elementos</a:t>
+            </a:r>
+          </a:p>
+          <a:p>
+            <a:r>
+              <a:rPr lang="pt-BR" dirty="0" smtClean="0"/>
+              <a:t>Grau de importância de conceitos</a:t>
+            </a:r>
+          </a:p>
+          <a:p>
+            <a:r>
+              <a:rPr lang="pt-BR" dirty="0" smtClean="0"/>
+              <a:t>Tratamento matemático por meio da teoria de grafos</a:t>
+            </a:r>
+          </a:p>
+          <a:p>
+            <a:r>
+              <a:rPr lang="pt-BR" dirty="0" smtClean="0"/>
+              <a:t>Estrutura de “crenças”</a:t>
+            </a:r>
+          </a:p>
+          <a:p>
+            <a:r>
+              <a:rPr lang="pt-BR" dirty="0" smtClean="0"/>
+              <a:t>Predizer </a:t>
+            </a:r>
+            <a:r>
+              <a:rPr lang="pt-BR" dirty="0" err="1" smtClean="0"/>
+              <a:t>consequências</a:t>
+            </a:r>
+            <a:endParaRPr lang="pt-BR" dirty="0" smtClean="0"/>
+          </a:p>
+          <a:p>
+            <a:r>
+              <a:rPr lang="pt-BR" dirty="0" smtClean="0"/>
+              <a:t>Incertezas </a:t>
+            </a:r>
+            <a:r>
+              <a:rPr lang="pt-BR" dirty="0" err="1" smtClean="0"/>
+              <a:t>Fuzzy</a:t>
+            </a:r>
+            <a:endParaRPr lang="pt-BR" dirty="0" smtClean="0"/>
+          </a:p>
+        </p:txBody>
+      </p:sp>
+      <p:pic>
+        <p:nvPicPr>
+          <p:cNvPr id="6146" name="Picture 2" descr="http://www.scielo.br/img/revistas/gp/v17n3/04f04.gif"/>
+          <p:cNvPicPr>
+            <a:picLocks noChangeAspect="1" noChangeArrowheads="1"/>
+          </p:cNvPicPr>
+          <p:nvPr/>
+        </p:nvPicPr>
+        <p:blipFill>
+          <a:blip r:embed="rId2" cstate="print"/>
+          <a:srcRect/>
+          <a:stretch>
+            <a:fillRect/>
+          </a:stretch>
+        </p:blipFill>
+        <p:spPr bwMode="auto">
+          <a:xfrm>
+            <a:off x="4419600" y="3276600"/>
+            <a:ext cx="4152073" cy="2895600"/>
+          </a:xfrm>
+          <a:prstGeom prst="rect">
+            <a:avLst/>
+          </a:prstGeom>
+          <a:noFill/>
+        </p:spPr>
+      </p:pic>
     </p:spTree>
   </p:cSld>
   <p:clrMapOvr>

</xml_diff>

<commit_message>
Adicionada pasta algoritmos para desenvolvimento do código para a TS
</commit_message>
<xml_diff>
--- a/qualificacao.pptx
+++ b/qualificacao.pptx
@@ -263,7 +263,7 @@
             <a:fld id="{1D8BD707-D9CF-40AE-B4C6-C98DA3205C09}" type="datetimeFigureOut">
               <a:rPr lang="en-US" smtClean="0"/>
               <a:pPr/>
-              <a:t>10/17/2011</a:t>
+              <a:t>10/18/2011</a:t>
             </a:fld>
             <a:endParaRPr lang="en-US"/>
           </a:p>
@@ -624,7 +624,7 @@
             <a:fld id="{1D8BD707-D9CF-40AE-B4C6-C98DA3205C09}" type="datetimeFigureOut">
               <a:rPr lang="en-US" smtClean="0"/>
               <a:pPr/>
-              <a:t>10/17/2011</a:t>
+              <a:t>10/18/2011</a:t>
             </a:fld>
             <a:endParaRPr lang="en-US"/>
           </a:p>
@@ -801,7 +801,7 @@
             <a:fld id="{1D8BD707-D9CF-40AE-B4C6-C98DA3205C09}" type="datetimeFigureOut">
               <a:rPr lang="en-US" smtClean="0"/>
               <a:pPr/>
-              <a:t>10/17/2011</a:t>
+              <a:t>10/18/2011</a:t>
             </a:fld>
             <a:endParaRPr lang="en-US"/>
           </a:p>
@@ -1038,7 +1038,7 @@
             <a:fld id="{1D8BD707-D9CF-40AE-B4C6-C98DA3205C09}" type="datetimeFigureOut">
               <a:rPr lang="en-US" smtClean="0"/>
               <a:pPr/>
-              <a:t>10/17/2011</a:t>
+              <a:t>10/18/2011</a:t>
             </a:fld>
             <a:endParaRPr lang="en-US"/>
           </a:p>
@@ -1309,7 +1309,7 @@
             <a:fld id="{1D8BD707-D9CF-40AE-B4C6-C98DA3205C09}" type="datetimeFigureOut">
               <a:rPr lang="en-US" smtClean="0"/>
               <a:pPr/>
-              <a:t>10/17/2011</a:t>
+              <a:t>10/18/2011</a:t>
             </a:fld>
             <a:endParaRPr lang="en-US"/>
           </a:p>
@@ -1531,7 +1531,7 @@
             <a:fld id="{1D8BD707-D9CF-40AE-B4C6-C98DA3205C09}" type="datetimeFigureOut">
               <a:rPr lang="en-US" smtClean="0"/>
               <a:pPr/>
-              <a:t>10/17/2011</a:t>
+              <a:t>10/18/2011</a:t>
             </a:fld>
             <a:endParaRPr lang="en-US"/>
           </a:p>
@@ -1885,7 +1885,7 @@
             <a:fld id="{1D8BD707-D9CF-40AE-B4C6-C98DA3205C09}" type="datetimeFigureOut">
               <a:rPr lang="en-US" smtClean="0"/>
               <a:pPr/>
-              <a:t>10/17/2011</a:t>
+              <a:t>10/18/2011</a:t>
             </a:fld>
             <a:endParaRPr lang="en-US"/>
           </a:p>
@@ -2119,7 +2119,7 @@
             <a:fld id="{1D8BD707-D9CF-40AE-B4C6-C98DA3205C09}" type="datetimeFigureOut">
               <a:rPr lang="en-US" smtClean="0"/>
               <a:pPr/>
-              <a:t>10/17/2011</a:t>
+              <a:t>10/18/2011</a:t>
             </a:fld>
             <a:endParaRPr lang="en-US"/>
           </a:p>
@@ -2261,7 +2261,7 @@
             <a:fld id="{1D8BD707-D9CF-40AE-B4C6-C98DA3205C09}" type="datetimeFigureOut">
               <a:rPr lang="en-US" smtClean="0"/>
               <a:pPr/>
-              <a:t>10/17/2011</a:t>
+              <a:t>10/18/2011</a:t>
             </a:fld>
             <a:endParaRPr lang="en-US"/>
           </a:p>
@@ -2540,7 +2540,7 @@
             <a:fld id="{1D8BD707-D9CF-40AE-B4C6-C98DA3205C09}" type="datetimeFigureOut">
               <a:rPr lang="en-US" smtClean="0"/>
               <a:pPr/>
-              <a:t>10/17/2011</a:t>
+              <a:t>10/18/2011</a:t>
             </a:fld>
             <a:endParaRPr lang="en-US"/>
           </a:p>
@@ -2949,7 +2949,7 @@
             <a:fld id="{1D8BD707-D9CF-40AE-B4C6-C98DA3205C09}" type="datetimeFigureOut">
               <a:rPr lang="en-US" smtClean="0"/>
               <a:pPr/>
-              <a:t>10/17/2011</a:t>
+              <a:t>10/18/2011</a:t>
             </a:fld>
             <a:endParaRPr lang="en-US"/>
           </a:p>
@@ -3289,7 +3289,7 @@
             <a:fld id="{1D8BD707-D9CF-40AE-B4C6-C98DA3205C09}" type="datetimeFigureOut">
               <a:rPr lang="en-US" smtClean="0"/>
               <a:pPr/>
-              <a:t>10/17/2011</a:t>
+              <a:t>10/18/2011</a:t>
             </a:fld>
             <a:endParaRPr lang="en-US"/>
           </a:p>
@@ -4040,8 +4040,44 @@
             <a:pPr lvl="1"/>
             <a:r>
               <a:rPr lang="pt-BR" dirty="0" smtClean="0"/>
-              <a:t>Assimilação dos conceitos</a:t>
-            </a:r>
+              <a:t>Assimilação dos </a:t>
+            </a:r>
+            <a:r>
+              <a:rPr lang="pt-BR" dirty="0" smtClean="0"/>
+              <a:t>conceitos</a:t>
+            </a:r>
+          </a:p>
+          <a:p>
+            <a:pPr lvl="1"/>
+            <a:endParaRPr lang="pt-BR" dirty="0" smtClean="0"/>
+          </a:p>
+          <a:p>
+            <a:r>
+              <a:rPr lang="pt-BR" dirty="0" smtClean="0"/>
+              <a:t>Programação dos Algoritmos</a:t>
+            </a:r>
+          </a:p>
+          <a:p>
+            <a:pPr lvl="1"/>
+            <a:r>
+              <a:rPr lang="pt-BR" dirty="0" smtClean="0"/>
+              <a:t>Cross-Compiler</a:t>
+            </a:r>
+          </a:p>
+          <a:p>
+            <a:pPr lvl="1"/>
+            <a:r>
+              <a:rPr lang="pt-BR" dirty="0" smtClean="0"/>
+              <a:t>Teste dos Algoritmos</a:t>
+            </a:r>
+          </a:p>
+          <a:p>
+            <a:pPr lvl="1"/>
+            <a:r>
+              <a:rPr lang="pt-BR" smtClean="0"/>
+              <a:t>Comparação</a:t>
+            </a:r>
+            <a:endParaRPr lang="pt-BR" dirty="0" smtClean="0"/>
           </a:p>
           <a:p>
             <a:pPr lvl="1"/>
@@ -4828,11 +4864,7 @@
           <a:p>
             <a:r>
               <a:rPr lang="pt-BR" dirty="0" smtClean="0"/>
-              <a:t>Especificações </a:t>
-            </a:r>
-            <a:r>
-              <a:rPr lang="pt-BR" dirty="0" smtClean="0"/>
-              <a:t>do Robô</a:t>
+              <a:t>Especificações do Robô</a:t>
             </a:r>
             <a:endParaRPr lang="pt-BR" dirty="0"/>
           </a:p>
@@ -4855,11 +4887,7 @@
           <a:p>
             <a:r>
               <a:rPr lang="pt-BR" dirty="0" smtClean="0"/>
-              <a:t>Sensores </a:t>
-            </a:r>
-            <a:r>
-              <a:rPr lang="pt-BR" dirty="0" smtClean="0"/>
-              <a:t>IR 2Y0A02F98</a:t>
+              <a:t>Sensores IR 2Y0A02F98</a:t>
             </a:r>
           </a:p>
           <a:p>
@@ -4867,7 +4895,6 @@
               <a:rPr lang="pt-BR" dirty="0" smtClean="0"/>
               <a:t>Microcontrolador C8051F340DK</a:t>
             </a:r>
-            <a:endParaRPr lang="pt-BR" dirty="0" smtClean="0"/>
           </a:p>
           <a:p>
             <a:r>

</xml_diff>